<commit_message>
uml/CD/combine/basic: update question description and hint
</commit_message>
<xml_diff>
--- a/diagrams/uml/classDiagrams/combine/objectDiagramsForClassDiagramExtra.pptx
+++ b/diagrams/uml/classDiagrams/combine/objectDiagramsForClassDiagramExtra.pptx
@@ -304,7 +304,7 @@
           <a:p>
             <a:fld id="{A0F86979-30DA-49EE-A740-32EBA6D2B7DE}" type="datetimeFigureOut">
               <a:rPr lang="en-SG" smtClean="0"/>
-              <a:t>5/9/2017</a:t>
+              <a:t>10/9/2018</a:t>
             </a:fld>
             <a:endParaRPr lang="en-SG"/>
           </a:p>
@@ -474,7 +474,7 @@
           <a:p>
             <a:fld id="{A0F86979-30DA-49EE-A740-32EBA6D2B7DE}" type="datetimeFigureOut">
               <a:rPr lang="en-SG" smtClean="0"/>
-              <a:t>5/9/2017</a:t>
+              <a:t>10/9/2018</a:t>
             </a:fld>
             <a:endParaRPr lang="en-SG"/>
           </a:p>
@@ -654,7 +654,7 @@
           <a:p>
             <a:fld id="{A0F86979-30DA-49EE-A740-32EBA6D2B7DE}" type="datetimeFigureOut">
               <a:rPr lang="en-SG" smtClean="0"/>
-              <a:t>5/9/2017</a:t>
+              <a:t>10/9/2018</a:t>
             </a:fld>
             <a:endParaRPr lang="en-SG"/>
           </a:p>
@@ -824,7 +824,7 @@
           <a:p>
             <a:fld id="{A0F86979-30DA-49EE-A740-32EBA6D2B7DE}" type="datetimeFigureOut">
               <a:rPr lang="en-SG" smtClean="0"/>
-              <a:t>5/9/2017</a:t>
+              <a:t>10/9/2018</a:t>
             </a:fld>
             <a:endParaRPr lang="en-SG"/>
           </a:p>
@@ -1070,7 +1070,7 @@
           <a:p>
             <a:fld id="{A0F86979-30DA-49EE-A740-32EBA6D2B7DE}" type="datetimeFigureOut">
               <a:rPr lang="en-SG" smtClean="0"/>
-              <a:t>5/9/2017</a:t>
+              <a:t>10/9/2018</a:t>
             </a:fld>
             <a:endParaRPr lang="en-SG"/>
           </a:p>
@@ -1358,7 +1358,7 @@
           <a:p>
             <a:fld id="{A0F86979-30DA-49EE-A740-32EBA6D2B7DE}" type="datetimeFigureOut">
               <a:rPr lang="en-SG" smtClean="0"/>
-              <a:t>5/9/2017</a:t>
+              <a:t>10/9/2018</a:t>
             </a:fld>
             <a:endParaRPr lang="en-SG"/>
           </a:p>
@@ -1780,7 +1780,7 @@
           <a:p>
             <a:fld id="{A0F86979-30DA-49EE-A740-32EBA6D2B7DE}" type="datetimeFigureOut">
               <a:rPr lang="en-SG" smtClean="0"/>
-              <a:t>5/9/2017</a:t>
+              <a:t>10/9/2018</a:t>
             </a:fld>
             <a:endParaRPr lang="en-SG"/>
           </a:p>
@@ -1898,7 +1898,7 @@
           <a:p>
             <a:fld id="{A0F86979-30DA-49EE-A740-32EBA6D2B7DE}" type="datetimeFigureOut">
               <a:rPr lang="en-SG" smtClean="0"/>
-              <a:t>5/9/2017</a:t>
+              <a:t>10/9/2018</a:t>
             </a:fld>
             <a:endParaRPr lang="en-SG"/>
           </a:p>
@@ -1993,7 +1993,7 @@
           <a:p>
             <a:fld id="{A0F86979-30DA-49EE-A740-32EBA6D2B7DE}" type="datetimeFigureOut">
               <a:rPr lang="en-SG" smtClean="0"/>
-              <a:t>5/9/2017</a:t>
+              <a:t>10/9/2018</a:t>
             </a:fld>
             <a:endParaRPr lang="en-SG"/>
           </a:p>
@@ -2270,7 +2270,7 @@
           <a:p>
             <a:fld id="{A0F86979-30DA-49EE-A740-32EBA6D2B7DE}" type="datetimeFigureOut">
               <a:rPr lang="en-SG" smtClean="0"/>
-              <a:t>5/9/2017</a:t>
+              <a:t>10/9/2018</a:t>
             </a:fld>
             <a:endParaRPr lang="en-SG"/>
           </a:p>
@@ -2523,7 +2523,7 @@
           <a:p>
             <a:fld id="{A0F86979-30DA-49EE-A740-32EBA6D2B7DE}" type="datetimeFigureOut">
               <a:rPr lang="en-SG" smtClean="0"/>
-              <a:t>5/9/2017</a:t>
+              <a:t>10/9/2018</a:t>
             </a:fld>
             <a:endParaRPr lang="en-SG"/>
           </a:p>
@@ -2736,7 +2736,7 @@
           <a:p>
             <a:fld id="{A0F86979-30DA-49EE-A740-32EBA6D2B7DE}" type="datetimeFigureOut">
               <a:rPr lang="en-SG" smtClean="0"/>
-              <a:t>5/9/2017</a:t>
+              <a:t>10/9/2018</a:t>
             </a:fld>
             <a:endParaRPr lang="en-SG"/>
           </a:p>
@@ -3149,11 +3149,7 @@
             <a:pPr algn="ctr"/>
             <a:r>
               <a:rPr lang="en-US" sz="1400" u="sng" dirty="0" smtClean="0"/>
-              <a:t>:</a:t>
-            </a:r>
-            <a:r>
-              <a:rPr lang="en-US" sz="1400" u="sng" dirty="0" smtClean="0"/>
-              <a:t>Address</a:t>
+              <a:t>:Address</a:t>
             </a:r>
             <a:endParaRPr lang="en-SG" sz="1400" u="sng" dirty="0"/>
           </a:p>
@@ -4018,120 +4014,6 @@
           </a:p>
         </p:txBody>
       </p:sp>
-      <p:sp>
-        <p:nvSpPr>
-          <p:cNvPr id="69" name="Rectangle 68"/>
-          <p:cNvSpPr/>
-          <p:nvPr/>
-        </p:nvSpPr>
-        <p:spPr>
-          <a:xfrm>
-            <a:off x="6252275" y="5547066"/>
-            <a:ext cx="1484233" cy="314102"/>
-          </a:xfrm>
-          <a:prstGeom prst="rect">
-            <a:avLst/>
-          </a:prstGeom>
-        </p:spPr>
-        <p:style>
-          <a:lnRef idx="2">
-            <a:schemeClr val="accent4">
-              <a:shade val="50000"/>
-            </a:schemeClr>
-          </a:lnRef>
-          <a:fillRef idx="1">
-            <a:schemeClr val="accent4"/>
-          </a:fillRef>
-          <a:effectRef idx="0">
-            <a:schemeClr val="accent4"/>
-          </a:effectRef>
-          <a:fontRef idx="minor">
-            <a:schemeClr val="lt1"/>
-          </a:fontRef>
-        </p:style>
-        <p:txBody>
-          <a:bodyPr rtlCol="0" anchor="ctr"/>
-          <a:lstStyle/>
-          <a:p>
-            <a:pPr algn="ctr"/>
-            <a:r>
-              <a:rPr lang="en-US" sz="1400" u="sng" dirty="0" smtClean="0"/>
-              <a:t>:Address</a:t>
-            </a:r>
-            <a:endParaRPr lang="en-SG" sz="1400" u="sng" dirty="0"/>
-          </a:p>
-        </p:txBody>
-      </p:sp>
-      <p:cxnSp>
-        <p:nvCxnSpPr>
-          <p:cNvPr id="70" name="Elbow Connector 69"/>
-          <p:cNvCxnSpPr>
-            <a:stCxn id="73" idx="3"/>
-            <a:endCxn id="69" idx="1"/>
-          </p:cNvCxnSpPr>
-          <p:nvPr/>
-        </p:nvCxnSpPr>
-        <p:spPr>
-          <a:xfrm flipV="1">
-            <a:off x="5292080" y="5704117"/>
-            <a:ext cx="960195" cy="1910"/>
-          </a:xfrm>
-          <a:prstGeom prst="bentConnector3">
-            <a:avLst>
-              <a:gd name="adj1" fmla="val 50000"/>
-            </a:avLst>
-          </a:prstGeom>
-          <a:ln>
-            <a:tailEnd type="arrow"/>
-          </a:ln>
-        </p:spPr>
-        <p:style>
-          <a:lnRef idx="2">
-            <a:schemeClr val="accent2">
-              <a:shade val="50000"/>
-            </a:schemeClr>
-          </a:lnRef>
-          <a:fillRef idx="1">
-            <a:schemeClr val="accent2"/>
-          </a:fillRef>
-          <a:effectRef idx="0">
-            <a:schemeClr val="accent2"/>
-          </a:effectRef>
-          <a:fontRef idx="minor">
-            <a:schemeClr val="lt1"/>
-          </a:fontRef>
-        </p:style>
-      </p:cxnSp>
-      <p:sp>
-        <p:nvSpPr>
-          <p:cNvPr id="71" name="TextBox 70"/>
-          <p:cNvSpPr txBox="1"/>
-          <p:nvPr/>
-        </p:nvSpPr>
-        <p:spPr>
-          <a:xfrm>
-            <a:off x="5696677" y="5716120"/>
-            <a:ext cx="697453" cy="307777"/>
-          </a:xfrm>
-          <a:prstGeom prst="rect">
-            <a:avLst/>
-          </a:prstGeom>
-          <a:noFill/>
-        </p:spPr>
-        <p:txBody>
-          <a:bodyPr wrap="square" rtlCol="0">
-            <a:spAutoFit/>
-          </a:bodyPr>
-          <a:lstStyle/>
-          <a:p>
-            <a:r>
-              <a:rPr lang="en-US" sz="1400" dirty="0" smtClean="0"/>
-              <a:t>home</a:t>
-            </a:r>
-            <a:endParaRPr lang="en-SG" sz="1400" dirty="0"/>
-          </a:p>
-        </p:txBody>
-      </p:sp>
       <p:cxnSp>
         <p:nvCxnSpPr>
           <p:cNvPr id="72" name="Elbow Connector 71"/>
@@ -4246,23 +4128,139 @@
           </a:p>
         </p:txBody>
       </p:sp>
+      <p:sp>
+        <p:nvSpPr>
+          <p:cNvPr id="35" name="TextBox 34"/>
+          <p:cNvSpPr txBox="1"/>
+          <p:nvPr/>
+        </p:nvSpPr>
+        <p:spPr>
+          <a:xfrm>
+            <a:off x="-80466" y="1973888"/>
+            <a:ext cx="948988" cy="307777"/>
+          </a:xfrm>
+          <a:prstGeom prst="rect">
+            <a:avLst/>
+          </a:prstGeom>
+          <a:noFill/>
+        </p:spPr>
+        <p:txBody>
+          <a:bodyPr wrap="square" rtlCol="0">
+            <a:spAutoFit/>
+          </a:bodyPr>
+          <a:lstStyle/>
+          <a:p>
+            <a:r>
+              <a:rPr lang="en-US" sz="1400" dirty="0" smtClean="0"/>
+              <a:t>guardian</a:t>
+            </a:r>
+            <a:endParaRPr lang="en-SG" sz="1400" dirty="0"/>
+          </a:p>
+        </p:txBody>
+      </p:sp>
+      <p:sp>
+        <p:nvSpPr>
+          <p:cNvPr id="36" name="Rectangle 35"/>
+          <p:cNvSpPr/>
+          <p:nvPr/>
+        </p:nvSpPr>
+        <p:spPr>
+          <a:xfrm>
+            <a:off x="3761185" y="6195329"/>
+            <a:ext cx="1539773" cy="310743"/>
+          </a:xfrm>
+          <a:prstGeom prst="rect">
+            <a:avLst/>
+          </a:prstGeom>
+        </p:spPr>
+        <p:style>
+          <a:lnRef idx="2">
+            <a:schemeClr val="accent5">
+              <a:shade val="50000"/>
+            </a:schemeClr>
+          </a:lnRef>
+          <a:fillRef idx="1">
+            <a:schemeClr val="accent5"/>
+          </a:fillRef>
+          <a:effectRef idx="0">
+            <a:schemeClr val="accent5"/>
+          </a:effectRef>
+          <a:fontRef idx="minor">
+            <a:schemeClr val="lt1"/>
+          </a:fontRef>
+        </p:style>
+        <p:txBody>
+          <a:bodyPr rtlCol="0" anchor="ctr"/>
+          <a:lstStyle/>
+          <a:p>
+            <a:pPr algn="ctr"/>
+            <a:r>
+              <a:rPr lang="en-US" sz="1400" u="sng" dirty="0" smtClean="0"/>
+              <a:t>:</a:t>
+            </a:r>
+            <a:r>
+              <a:rPr lang="en-US" sz="1400" u="sng" dirty="0" err="1" smtClean="0"/>
+              <a:t>ContactNumber</a:t>
+            </a:r>
+            <a:endParaRPr lang="en-SG" sz="1400" u="sng" dirty="0"/>
+          </a:p>
+        </p:txBody>
+      </p:sp>
       <p:cxnSp>
         <p:nvCxnSpPr>
-          <p:cNvPr id="78" name="Elbow Connector 77"/>
+          <p:cNvPr id="37" name="Elbow Connector 36"/>
           <p:cNvCxnSpPr>
-            <a:stCxn id="67" idx="0"/>
-            <a:endCxn id="69" idx="0"/>
+            <a:stCxn id="67" idx="2"/>
+            <a:endCxn id="36" idx="1"/>
           </p:cNvCxnSpPr>
           <p:nvPr/>
         </p:nvCxnSpPr>
         <p:spPr>
-          <a:xfrm rot="5400000" flipH="1" flipV="1">
-            <a:off x="4151854" y="2716728"/>
-            <a:ext cx="12200" cy="5672876"/>
+          <a:xfrm rot="16200000" flipH="1">
+            <a:off x="2301004" y="4890520"/>
+            <a:ext cx="480692" cy="2439669"/>
+          </a:xfrm>
+          <a:prstGeom prst="bentConnector2">
+            <a:avLst/>
+          </a:prstGeom>
+          <a:ln>
+            <a:tailEnd type="arrow"/>
+          </a:ln>
+        </p:spPr>
+        <p:style>
+          <a:lnRef idx="2">
+            <a:schemeClr val="accent2">
+              <a:shade val="50000"/>
+            </a:schemeClr>
+          </a:lnRef>
+          <a:fillRef idx="1">
+            <a:schemeClr val="accent2"/>
+          </a:fillRef>
+          <a:effectRef idx="0">
+            <a:schemeClr val="accent2"/>
+          </a:effectRef>
+          <a:fontRef idx="minor">
+            <a:schemeClr val="lt1"/>
+          </a:fontRef>
+        </p:style>
+      </p:cxnSp>
+      <p:cxnSp>
+        <p:nvCxnSpPr>
+          <p:cNvPr id="39" name="Elbow Connector 38"/>
+          <p:cNvCxnSpPr>
+            <a:stCxn id="73" idx="2"/>
+            <a:endCxn id="36" idx="0"/>
+          </p:cNvCxnSpPr>
+          <p:nvPr/>
+        </p:nvCxnSpPr>
+        <p:spPr>
+          <a:xfrm rot="5400000">
+            <a:off x="4366569" y="6025901"/>
+            <a:ext cx="333931" cy="4924"/>
           </a:xfrm>
           <a:prstGeom prst="bentConnector3">
             <a:avLst>
-              <a:gd name="adj1" fmla="val 1973770"/>
+              <a:gd name="adj1" fmla="val 50000"/>
             </a:avLst>
           </a:prstGeom>
           <a:ln>
@@ -4286,66 +4284,6 @@
           </a:fontRef>
         </p:style>
       </p:cxnSp>
-      <p:sp>
-        <p:nvSpPr>
-          <p:cNvPr id="80" name="TextBox 79"/>
-          <p:cNvSpPr txBox="1"/>
-          <p:nvPr/>
-        </p:nvSpPr>
-        <p:spPr>
-          <a:xfrm>
-            <a:off x="7079960" y="5204031"/>
-            <a:ext cx="697453" cy="307777"/>
-          </a:xfrm>
-          <a:prstGeom prst="rect">
-            <a:avLst/>
-          </a:prstGeom>
-          <a:noFill/>
-        </p:spPr>
-        <p:txBody>
-          <a:bodyPr wrap="square" rtlCol="0">
-            <a:spAutoFit/>
-          </a:bodyPr>
-          <a:lstStyle/>
-          <a:p>
-            <a:r>
-              <a:rPr lang="en-US" sz="1400" dirty="0" smtClean="0"/>
-              <a:t>home</a:t>
-            </a:r>
-            <a:endParaRPr lang="en-SG" sz="1400" dirty="0"/>
-          </a:p>
-        </p:txBody>
-      </p:sp>
-      <p:sp>
-        <p:nvSpPr>
-          <p:cNvPr id="35" name="TextBox 34"/>
-          <p:cNvSpPr txBox="1"/>
-          <p:nvPr/>
-        </p:nvSpPr>
-        <p:spPr>
-          <a:xfrm>
-            <a:off x="-80466" y="1973888"/>
-            <a:ext cx="948988" cy="307777"/>
-          </a:xfrm>
-          <a:prstGeom prst="rect">
-            <a:avLst/>
-          </a:prstGeom>
-          <a:noFill/>
-        </p:spPr>
-        <p:txBody>
-          <a:bodyPr wrap="square" rtlCol="0">
-            <a:spAutoFit/>
-          </a:bodyPr>
-          <a:lstStyle/>
-          <a:p>
-            <a:r>
-              <a:rPr lang="en-US" sz="1400" dirty="0" smtClean="0"/>
-              <a:t>guardian</a:t>
-            </a:r>
-            <a:endParaRPr lang="en-SG" sz="1400" dirty="0"/>
-          </a:p>
-        </p:txBody>
-      </p:sp>
     </p:spTree>
     <p:extLst>
       <p:ext uri="{BB962C8B-B14F-4D97-AF65-F5344CB8AC3E}">
@@ -4407,7 +4345,7 @@
                                 </p:cTn>
                               </p:par>
                               <p:par>
-                                <p:cTn id="7" presetID="1" presetClass="exit" presetSubtype="0" fill="hold" grpId="0" nodeType="withEffect">
+                                <p:cTn id="7" presetID="1" presetClass="exit" presetSubtype="0" fill="hold" nodeType="withEffect">
                                   <p:stCondLst>
                                     <p:cond delay="0"/>
                                   </p:stCondLst>
@@ -4420,7 +4358,7 @@
                                           </p:stCondLst>
                                         </p:cTn>
                                         <p:tgtEl>
-                                          <p:spTgt spid="69"/>
+                                          <p:spTgt spid="72"/>
                                         </p:tgtEl>
                                         <p:attrNameLst>
                                           <p:attrName>style.visibility</p:attrName>
@@ -4434,7 +4372,7 @@
                                 </p:cTn>
                               </p:par>
                               <p:par>
-                                <p:cTn id="9" presetID="1" presetClass="exit" presetSubtype="0" fill="hold" nodeType="withEffect">
+                                <p:cTn id="9" presetID="1" presetClass="exit" presetSubtype="0" fill="hold" grpId="0" nodeType="withEffect">
                                   <p:stCondLst>
                                     <p:cond delay="0"/>
                                   </p:stCondLst>
@@ -4447,7 +4385,7 @@
                                           </p:stCondLst>
                                         </p:cTn>
                                         <p:tgtEl>
-                                          <p:spTgt spid="70"/>
+                                          <p:spTgt spid="73"/>
                                         </p:tgtEl>
                                         <p:attrNameLst>
                                           <p:attrName>style.visibility</p:attrName>
@@ -4474,142 +4412,7 @@
                                           </p:stCondLst>
                                         </p:cTn>
                                         <p:tgtEl>
-                                          <p:spTgt spid="71"/>
-                                        </p:tgtEl>
-                                        <p:attrNameLst>
-                                          <p:attrName>style.visibility</p:attrName>
-                                        </p:attrNameLst>
-                                      </p:cBhvr>
-                                      <p:to>
-                                        <p:strVal val="hidden"/>
-                                      </p:to>
-                                    </p:set>
-                                  </p:childTnLst>
-                                </p:cTn>
-                              </p:par>
-                              <p:par>
-                                <p:cTn id="13" presetID="1" presetClass="exit" presetSubtype="0" fill="hold" nodeType="withEffect">
-                                  <p:stCondLst>
-                                    <p:cond delay="0"/>
-                                  </p:stCondLst>
-                                  <p:childTnLst>
-                                    <p:set>
-                                      <p:cBhvr>
-                                        <p:cTn id="14" dur="1" fill="hold">
-                                          <p:stCondLst>
-                                            <p:cond delay="0"/>
-                                          </p:stCondLst>
-                                        </p:cTn>
-                                        <p:tgtEl>
-                                          <p:spTgt spid="72"/>
-                                        </p:tgtEl>
-                                        <p:attrNameLst>
-                                          <p:attrName>style.visibility</p:attrName>
-                                        </p:attrNameLst>
-                                      </p:cBhvr>
-                                      <p:to>
-                                        <p:strVal val="hidden"/>
-                                      </p:to>
-                                    </p:set>
-                                  </p:childTnLst>
-                                </p:cTn>
-                              </p:par>
-                              <p:par>
-                                <p:cTn id="15" presetID="1" presetClass="exit" presetSubtype="0" fill="hold" grpId="0" nodeType="withEffect">
-                                  <p:stCondLst>
-                                    <p:cond delay="0"/>
-                                  </p:stCondLst>
-                                  <p:childTnLst>
-                                    <p:set>
-                                      <p:cBhvr>
-                                        <p:cTn id="16" dur="1" fill="hold">
-                                          <p:stCondLst>
-                                            <p:cond delay="0"/>
-                                          </p:stCondLst>
-                                        </p:cTn>
-                                        <p:tgtEl>
-                                          <p:spTgt spid="73"/>
-                                        </p:tgtEl>
-                                        <p:attrNameLst>
-                                          <p:attrName>style.visibility</p:attrName>
-                                        </p:attrNameLst>
-                                      </p:cBhvr>
-                                      <p:to>
-                                        <p:strVal val="hidden"/>
-                                      </p:to>
-                                    </p:set>
-                                  </p:childTnLst>
-                                </p:cTn>
-                              </p:par>
-                              <p:par>
-                                <p:cTn id="17" presetID="1" presetClass="exit" presetSubtype="0" fill="hold" grpId="0" nodeType="withEffect">
-                                  <p:stCondLst>
-                                    <p:cond delay="0"/>
-                                  </p:stCondLst>
-                                  <p:childTnLst>
-                                    <p:set>
-                                      <p:cBhvr>
-                                        <p:cTn id="18" dur="1" fill="hold">
-                                          <p:stCondLst>
-                                            <p:cond delay="0"/>
-                                          </p:stCondLst>
-                                        </p:cTn>
-                                        <p:tgtEl>
                                           <p:spTgt spid="74"/>
-                                        </p:tgtEl>
-                                        <p:attrNameLst>
-                                          <p:attrName>style.visibility</p:attrName>
-                                        </p:attrNameLst>
-                                      </p:cBhvr>
-                                      <p:to>
-                                        <p:strVal val="hidden"/>
-                                      </p:to>
-                                    </p:set>
-                                  </p:childTnLst>
-                                </p:cTn>
-                              </p:par>
-                              <p:par>
-                                <p:cTn id="19" presetID="1" presetClass="exit" presetSubtype="0" fill="hold" nodeType="withEffect">
-                                  <p:stCondLst>
-                                    <p:cond delay="0"/>
-                                  </p:stCondLst>
-                                  <p:childTnLst>
-                                    <p:set>
-                                      <p:cBhvr>
-                                        <p:cTn id="20" dur="1" fill="hold">
-                                          <p:stCondLst>
-                                            <p:cond delay="0"/>
-                                          </p:stCondLst>
-                                        </p:cTn>
-                                        <p:tgtEl>
-                                          <p:spTgt spid="78"/>
-                                        </p:tgtEl>
-                                        <p:attrNameLst>
-                                          <p:attrName>style.visibility</p:attrName>
-                                        </p:attrNameLst>
-                                      </p:cBhvr>
-                                      <p:to>
-                                        <p:strVal val="hidden"/>
-                                      </p:to>
-                                    </p:set>
-                                  </p:childTnLst>
-                                </p:cTn>
-                              </p:par>
-                              <p:par>
-                                <p:cTn id="21" presetID="1" presetClass="exit" presetSubtype="0" fill="hold" grpId="0" nodeType="withEffect">
-                                  <p:stCondLst>
-                                    <p:cond delay="0"/>
-                                  </p:stCondLst>
-                                  <p:childTnLst>
-                                    <p:set>
-                                      <p:cBhvr>
-                                        <p:cTn id="22" dur="1" fill="hold">
-                                          <p:stCondLst>
-                                            <p:cond delay="0"/>
-                                          </p:stCondLst>
-                                        </p:cTn>
-                                        <p:tgtEl>
-                                          <p:spTgt spid="80"/>
                                         </p:tgtEl>
                                         <p:attrNameLst>
                                           <p:attrName>style.visibility</p:attrName>
@@ -4629,26 +4432,26 @@
                     </p:cTn>
                   </p:par>
                   <p:par>
-                    <p:cTn id="23" fill="hold">
+                    <p:cTn id="13" fill="hold">
                       <p:stCondLst>
                         <p:cond delay="indefinite"/>
                       </p:stCondLst>
                       <p:childTnLst>
                         <p:par>
-                          <p:cTn id="24" fill="hold">
+                          <p:cTn id="14" fill="hold">
                             <p:stCondLst>
                               <p:cond delay="0"/>
                             </p:stCondLst>
                             <p:childTnLst>
                               <p:par>
-                                <p:cTn id="25" presetID="10" presetClass="entr" presetSubtype="0" fill="hold" grpId="0" nodeType="clickEffect">
+                                <p:cTn id="15" presetID="10" presetClass="entr" presetSubtype="0" fill="hold" grpId="0" nodeType="clickEffect">
                                   <p:stCondLst>
                                     <p:cond delay="0"/>
                                   </p:stCondLst>
                                   <p:childTnLst>
                                     <p:set>
                                       <p:cBhvr>
-                                        <p:cTn id="26" dur="1" fill="hold">
+                                        <p:cTn id="16" dur="1" fill="hold">
                                           <p:stCondLst>
                                             <p:cond delay="0"/>
                                           </p:stCondLst>
@@ -4666,7 +4469,7 @@
                                     </p:set>
                                     <p:animEffect transition="in" filter="fade">
                                       <p:cBhvr>
-                                        <p:cTn id="27" dur="500"/>
+                                        <p:cTn id="17" dur="500"/>
                                         <p:tgtEl>
                                           <p:spTgt spid="34"/>
                                         </p:tgtEl>
@@ -4676,14 +4479,14 @@
                                 </p:cTn>
                               </p:par>
                               <p:par>
-                                <p:cTn id="28" presetID="10" presetClass="entr" presetSubtype="0" fill="hold" grpId="0" nodeType="withEffect">
+                                <p:cTn id="18" presetID="10" presetClass="entr" presetSubtype="0" fill="hold" grpId="0" nodeType="withEffect">
                                   <p:stCondLst>
                                     <p:cond delay="0"/>
                                   </p:stCondLst>
                                   <p:childTnLst>
                                     <p:set>
                                       <p:cBhvr>
-                                        <p:cTn id="29" dur="1" fill="hold">
+                                        <p:cTn id="19" dur="1" fill="hold">
                                           <p:stCondLst>
                                             <p:cond delay="0"/>
                                           </p:stCondLst>
@@ -4701,7 +4504,7 @@
                                     </p:set>
                                     <p:animEffect transition="in" filter="fade">
                                       <p:cBhvr>
-                                        <p:cTn id="30" dur="500"/>
+                                        <p:cTn id="20" dur="500"/>
                                         <p:tgtEl>
                                           <p:spTgt spid="49"/>
                                         </p:tgtEl>
@@ -4711,14 +4514,14 @@
                                 </p:cTn>
                               </p:par>
                               <p:par>
-                                <p:cTn id="31" presetID="10" presetClass="entr" presetSubtype="0" fill="hold" nodeType="withEffect">
+                                <p:cTn id="21" presetID="10" presetClass="entr" presetSubtype="0" fill="hold" nodeType="withEffect">
                                   <p:stCondLst>
                                     <p:cond delay="0"/>
                                   </p:stCondLst>
                                   <p:childTnLst>
                                     <p:set>
                                       <p:cBhvr>
-                                        <p:cTn id="32" dur="1" fill="hold">
+                                        <p:cTn id="22" dur="1" fill="hold">
                                           <p:stCondLst>
                                             <p:cond delay="0"/>
                                           </p:stCondLst>
@@ -4736,7 +4539,7 @@
                                     </p:set>
                                     <p:animEffect transition="in" filter="fade">
                                       <p:cBhvr>
-                                        <p:cTn id="33" dur="500"/>
+                                        <p:cTn id="23" dur="500"/>
                                         <p:tgtEl>
                                           <p:spTgt spid="54"/>
                                         </p:tgtEl>
@@ -4746,14 +4549,14 @@
                                 </p:cTn>
                               </p:par>
                               <p:par>
-                                <p:cTn id="34" presetID="10" presetClass="entr" presetSubtype="0" fill="hold" nodeType="withEffect">
+                                <p:cTn id="24" presetID="10" presetClass="entr" presetSubtype="0" fill="hold" nodeType="withEffect">
                                   <p:stCondLst>
                                     <p:cond delay="0"/>
                                   </p:stCondLst>
                                   <p:childTnLst>
                                     <p:set>
                                       <p:cBhvr>
-                                        <p:cTn id="35" dur="1" fill="hold">
+                                        <p:cTn id="25" dur="1" fill="hold">
                                           <p:stCondLst>
                                             <p:cond delay="0"/>
                                           </p:stCondLst>
@@ -4771,7 +4574,7 @@
                                     </p:set>
                                     <p:animEffect transition="in" filter="fade">
                                       <p:cBhvr>
-                                        <p:cTn id="36" dur="500"/>
+                                        <p:cTn id="26" dur="500"/>
                                         <p:tgtEl>
                                           <p:spTgt spid="59"/>
                                         </p:tgtEl>
@@ -4781,14 +4584,14 @@
                                 </p:cTn>
                               </p:par>
                               <p:par>
-                                <p:cTn id="37" presetID="10" presetClass="entr" presetSubtype="0" fill="hold" grpId="0" nodeType="withEffect">
+                                <p:cTn id="27" presetID="10" presetClass="entr" presetSubtype="0" fill="hold" grpId="0" nodeType="withEffect">
                                   <p:stCondLst>
                                     <p:cond delay="0"/>
                                   </p:stCondLst>
                                   <p:childTnLst>
                                     <p:set>
                                       <p:cBhvr>
-                                        <p:cTn id="38" dur="1" fill="hold">
+                                        <p:cTn id="28" dur="1" fill="hold">
                                           <p:stCondLst>
                                             <p:cond delay="0"/>
                                           </p:stCondLst>
@@ -4806,7 +4609,7 @@
                                     </p:set>
                                     <p:animEffect transition="in" filter="fade">
                                       <p:cBhvr>
-                                        <p:cTn id="39" dur="500"/>
+                                        <p:cTn id="29" dur="500"/>
                                         <p:tgtEl>
                                           <p:spTgt spid="79"/>
                                         </p:tgtEl>
@@ -4816,14 +4619,14 @@
                                 </p:cTn>
                               </p:par>
                               <p:par>
-                                <p:cTn id="40" presetID="10" presetClass="entr" presetSubtype="0" fill="hold" grpId="0" nodeType="withEffect">
+                                <p:cTn id="30" presetID="10" presetClass="entr" presetSubtype="0" fill="hold" grpId="0" nodeType="withEffect">
                                   <p:stCondLst>
                                     <p:cond delay="0"/>
                                   </p:stCondLst>
                                   <p:childTnLst>
                                     <p:set>
                                       <p:cBhvr>
-                                        <p:cTn id="41" dur="1" fill="hold">
+                                        <p:cTn id="31" dur="1" fill="hold">
                                           <p:stCondLst>
                                             <p:cond delay="0"/>
                                           </p:stCondLst>
@@ -4841,7 +4644,7 @@
                                     </p:set>
                                     <p:animEffect transition="in" filter="fade">
                                       <p:cBhvr>
-                                        <p:cTn id="42" dur="500"/>
+                                        <p:cTn id="32" dur="500"/>
                                         <p:tgtEl>
                                           <p:spTgt spid="23"/>
                                         </p:tgtEl>
@@ -4851,14 +4654,14 @@
                                 </p:cTn>
                               </p:par>
                               <p:par>
-                                <p:cTn id="43" presetID="10" presetClass="entr" presetSubtype="0" fill="hold" nodeType="withEffect">
+                                <p:cTn id="33" presetID="10" presetClass="entr" presetSubtype="0" fill="hold" nodeType="withEffect">
                                   <p:stCondLst>
                                     <p:cond delay="0"/>
                                   </p:stCondLst>
                                   <p:childTnLst>
                                     <p:set>
                                       <p:cBhvr>
-                                        <p:cTn id="44" dur="1" fill="hold">
+                                        <p:cTn id="34" dur="1" fill="hold">
                                           <p:stCondLst>
                                             <p:cond delay="0"/>
                                           </p:stCondLst>
@@ -4876,7 +4679,7 @@
                                     </p:set>
                                     <p:animEffect transition="in" filter="fade">
                                       <p:cBhvr>
-                                        <p:cTn id="45" dur="500"/>
+                                        <p:cTn id="35" dur="500"/>
                                         <p:tgtEl>
                                           <p:spTgt spid="32"/>
                                         </p:tgtEl>
@@ -4886,14 +4689,14 @@
                                 </p:cTn>
                               </p:par>
                               <p:par>
-                                <p:cTn id="46" presetID="10" presetClass="entr" presetSubtype="0" fill="hold" grpId="0" nodeType="withEffect">
+                                <p:cTn id="36" presetID="10" presetClass="entr" presetSubtype="0" fill="hold" grpId="0" nodeType="withEffect">
                                   <p:stCondLst>
                                     <p:cond delay="0"/>
                                   </p:stCondLst>
                                   <p:childTnLst>
                                     <p:set>
                                       <p:cBhvr>
-                                        <p:cTn id="47" dur="1" fill="hold">
+                                        <p:cTn id="37" dur="1" fill="hold">
                                           <p:stCondLst>
                                             <p:cond delay="0"/>
                                           </p:stCondLst>
@@ -4911,7 +4714,7 @@
                                     </p:set>
                                     <p:animEffect transition="in" filter="fade">
                                       <p:cBhvr>
-                                        <p:cTn id="48" dur="500"/>
+                                        <p:cTn id="38" dur="500"/>
                                         <p:tgtEl>
                                           <p:spTgt spid="33"/>
                                         </p:tgtEl>
@@ -4921,14 +4724,14 @@
                                 </p:cTn>
                               </p:par>
                               <p:par>
-                                <p:cTn id="49" presetID="10" presetClass="entr" presetSubtype="0" fill="hold" grpId="0" nodeType="withEffect">
+                                <p:cTn id="39" presetID="10" presetClass="entr" presetSubtype="0" fill="hold" grpId="0" nodeType="withEffect">
                                   <p:stCondLst>
                                     <p:cond delay="0"/>
                                   </p:stCondLst>
                                   <p:childTnLst>
                                     <p:set>
                                       <p:cBhvr>
-                                        <p:cTn id="50" dur="1" fill="hold">
+                                        <p:cTn id="40" dur="1" fill="hold">
                                           <p:stCondLst>
                                             <p:cond delay="0"/>
                                           </p:stCondLst>
@@ -4946,7 +4749,7 @@
                                     </p:set>
                                     <p:animEffect transition="in" filter="fade">
                                       <p:cBhvr>
-                                        <p:cTn id="51" dur="500"/>
+                                        <p:cTn id="41" dur="500"/>
                                         <p:tgtEl>
                                           <p:spTgt spid="58"/>
                                         </p:tgtEl>
@@ -4962,26 +4765,26 @@
                     </p:cTn>
                   </p:par>
                   <p:par>
-                    <p:cTn id="52" fill="hold">
+                    <p:cTn id="42" fill="hold">
                       <p:stCondLst>
                         <p:cond delay="indefinite"/>
                       </p:stCondLst>
                       <p:childTnLst>
                         <p:par>
-                          <p:cTn id="53" fill="hold">
+                          <p:cTn id="43" fill="hold">
                             <p:stCondLst>
                               <p:cond delay="0"/>
                             </p:stCondLst>
                             <p:childTnLst>
                               <p:par>
-                                <p:cTn id="54" presetID="10" presetClass="entr" presetSubtype="0" fill="hold" nodeType="clickEffect">
+                                <p:cTn id="44" presetID="10" presetClass="entr" presetSubtype="0" fill="hold" nodeType="clickEffect">
                                   <p:stCondLst>
                                     <p:cond delay="0"/>
                                   </p:stCondLst>
                                   <p:childTnLst>
                                     <p:set>
                                       <p:cBhvr>
-                                        <p:cTn id="55" dur="1" fill="hold">
+                                        <p:cTn id="45" dur="1" fill="hold">
                                           <p:stCondLst>
                                             <p:cond delay="0"/>
                                           </p:stCondLst>
@@ -4999,7 +4802,7 @@
                                     </p:set>
                                     <p:animEffect transition="in" filter="fade">
                                       <p:cBhvr>
-                                        <p:cTn id="56" dur="500"/>
+                                        <p:cTn id="46" dur="500"/>
                                         <p:tgtEl>
                                           <p:spTgt spid="38"/>
                                         </p:tgtEl>
@@ -5009,14 +4812,14 @@
                                 </p:cTn>
                               </p:par>
                               <p:par>
-                                <p:cTn id="57" presetID="10" presetClass="entr" presetSubtype="0" fill="hold" nodeType="withEffect">
+                                <p:cTn id="47" presetID="10" presetClass="entr" presetSubtype="0" fill="hold" nodeType="withEffect">
                                   <p:stCondLst>
                                     <p:cond delay="0"/>
                                   </p:stCondLst>
                                   <p:childTnLst>
                                     <p:set>
                                       <p:cBhvr>
-                                        <p:cTn id="58" dur="1" fill="hold">
+                                        <p:cTn id="48" dur="1" fill="hold">
                                           <p:stCondLst>
                                             <p:cond delay="0"/>
                                           </p:stCondLst>
@@ -5034,7 +4837,7 @@
                                     </p:set>
                                     <p:animEffect transition="in" filter="fade">
                                       <p:cBhvr>
-                                        <p:cTn id="59" dur="500"/>
+                                        <p:cTn id="49" dur="500"/>
                                         <p:tgtEl>
                                           <p:spTgt spid="65"/>
                                         </p:tgtEl>
@@ -5044,14 +4847,14 @@
                                 </p:cTn>
                               </p:par>
                               <p:par>
-                                <p:cTn id="60" presetID="10" presetClass="entr" presetSubtype="0" fill="hold" grpId="0" nodeType="withEffect">
+                                <p:cTn id="50" presetID="10" presetClass="entr" presetSubtype="0" fill="hold" grpId="0" nodeType="withEffect">
                                   <p:stCondLst>
                                     <p:cond delay="0"/>
                                   </p:stCondLst>
                                   <p:childTnLst>
                                     <p:set>
                                       <p:cBhvr>
-                                        <p:cTn id="61" dur="1" fill="hold">
+                                        <p:cTn id="51" dur="1" fill="hold">
                                           <p:stCondLst>
                                             <p:cond delay="0"/>
                                           </p:stCondLst>
@@ -5069,7 +4872,7 @@
                                     </p:set>
                                     <p:animEffect transition="in" filter="fade">
                                       <p:cBhvr>
-                                        <p:cTn id="62" dur="500"/>
+                                        <p:cTn id="52" dur="500"/>
                                         <p:tgtEl>
                                           <p:spTgt spid="64"/>
                                         </p:tgtEl>
@@ -5085,26 +4888,26 @@
                     </p:cTn>
                   </p:par>
                   <p:par>
-                    <p:cTn id="63" fill="hold">
+                    <p:cTn id="53" fill="hold">
                       <p:stCondLst>
                         <p:cond delay="indefinite"/>
                       </p:stCondLst>
                       <p:childTnLst>
                         <p:par>
-                          <p:cTn id="64" fill="hold">
+                          <p:cTn id="54" fill="hold">
                             <p:stCondLst>
                               <p:cond delay="0"/>
                             </p:stCondLst>
                             <p:childTnLst>
                               <p:par>
-                                <p:cTn id="65" presetID="10" presetClass="entr" presetSubtype="0" fill="hold" grpId="0" nodeType="clickEffect">
+                                <p:cTn id="55" presetID="10" presetClass="entr" presetSubtype="0" fill="hold" grpId="0" nodeType="clickEffect">
                                   <p:stCondLst>
                                     <p:cond delay="0"/>
                                   </p:stCondLst>
                                   <p:childTnLst>
                                     <p:set>
                                       <p:cBhvr>
-                                        <p:cTn id="66" dur="1" fill="hold">
+                                        <p:cTn id="56" dur="1" fill="hold">
                                           <p:stCondLst>
                                             <p:cond delay="0"/>
                                           </p:stCondLst>
@@ -5122,7 +4925,7 @@
                                     </p:set>
                                     <p:animEffect transition="in" filter="fade">
                                       <p:cBhvr>
-                                        <p:cTn id="67" dur="500"/>
+                                        <p:cTn id="57" dur="500"/>
                                         <p:tgtEl>
                                           <p:spTgt spid="35"/>
                                         </p:tgtEl>
@@ -5132,14 +4935,14 @@
                                 </p:cTn>
                               </p:par>
                               <p:par>
-                                <p:cTn id="68" presetID="10" presetClass="entr" presetSubtype="0" fill="hold" grpId="0" nodeType="withEffect">
+                                <p:cTn id="58" presetID="10" presetClass="entr" presetSubtype="0" fill="hold" grpId="0" nodeType="withEffect">
                                   <p:stCondLst>
                                     <p:cond delay="0"/>
                                   </p:stCondLst>
                                   <p:childTnLst>
                                     <p:set>
                                       <p:cBhvr>
-                                        <p:cTn id="69" dur="1" fill="hold">
+                                        <p:cTn id="59" dur="1" fill="hold">
                                           <p:stCondLst>
                                             <p:cond delay="0"/>
                                           </p:stCondLst>
@@ -5157,7 +4960,7 @@
                                     </p:set>
                                     <p:animEffect transition="in" filter="fade">
                                       <p:cBhvr>
-                                        <p:cTn id="70" dur="500"/>
+                                        <p:cTn id="60" dur="500"/>
                                         <p:tgtEl>
                                           <p:spTgt spid="62"/>
                                         </p:tgtEl>
@@ -5167,14 +4970,14 @@
                                 </p:cTn>
                               </p:par>
                               <p:par>
-                                <p:cTn id="71" presetID="10" presetClass="entr" presetSubtype="0" fill="hold" nodeType="withEffect">
+                                <p:cTn id="61" presetID="10" presetClass="entr" presetSubtype="0" fill="hold" nodeType="withEffect">
                                   <p:stCondLst>
                                     <p:cond delay="0"/>
                                   </p:stCondLst>
                                   <p:childTnLst>
                                     <p:set>
                                       <p:cBhvr>
-                                        <p:cTn id="72" dur="1" fill="hold">
+                                        <p:cTn id="62" dur="1" fill="hold">
                                           <p:stCondLst>
                                             <p:cond delay="0"/>
                                           </p:stCondLst>
@@ -5192,7 +4995,7 @@
                                     </p:set>
                                     <p:animEffect transition="in" filter="fade">
                                       <p:cBhvr>
-                                        <p:cTn id="73" dur="500"/>
+                                        <p:cTn id="63" dur="500"/>
                                         <p:tgtEl>
                                           <p:spTgt spid="51"/>
                                         </p:tgtEl>
@@ -5202,14 +5005,14 @@
                                 </p:cTn>
                               </p:par>
                               <p:par>
-                                <p:cTn id="74" presetID="10" presetClass="entr" presetSubtype="0" fill="hold" grpId="0" nodeType="withEffect">
+                                <p:cTn id="64" presetID="10" presetClass="entr" presetSubtype="0" fill="hold" grpId="0" nodeType="withEffect">
                                   <p:stCondLst>
                                     <p:cond delay="0"/>
                                   </p:stCondLst>
                                   <p:childTnLst>
                                     <p:set>
                                       <p:cBhvr>
-                                        <p:cTn id="75" dur="1" fill="hold">
+                                        <p:cTn id="65" dur="1" fill="hold">
                                           <p:stCondLst>
                                             <p:cond delay="0"/>
                                           </p:stCondLst>
@@ -5227,7 +5030,7 @@
                                     </p:set>
                                     <p:animEffect transition="in" filter="fade">
                                       <p:cBhvr>
-                                        <p:cTn id="76" dur="500"/>
+                                        <p:cTn id="66" dur="500"/>
                                         <p:tgtEl>
                                           <p:spTgt spid="41"/>
                                         </p:tgtEl>
@@ -5237,14 +5040,14 @@
                                 </p:cTn>
                               </p:par>
                               <p:par>
-                                <p:cTn id="77" presetID="10" presetClass="entr" presetSubtype="0" fill="hold" nodeType="withEffect">
+                                <p:cTn id="67" presetID="10" presetClass="entr" presetSubtype="0" fill="hold" nodeType="withEffect">
                                   <p:stCondLst>
                                     <p:cond delay="0"/>
                                   </p:stCondLst>
                                   <p:childTnLst>
                                     <p:set>
                                       <p:cBhvr>
-                                        <p:cTn id="78" dur="1" fill="hold">
+                                        <p:cTn id="68" dur="1" fill="hold">
                                           <p:stCondLst>
                                             <p:cond delay="0"/>
                                           </p:stCondLst>
@@ -5262,7 +5065,7 @@
                                     </p:set>
                                     <p:animEffect transition="in" filter="fade">
                                       <p:cBhvr>
-                                        <p:cTn id="79" dur="500"/>
+                                        <p:cTn id="69" dur="500"/>
                                         <p:tgtEl>
                                           <p:spTgt spid="45"/>
                                         </p:tgtEl>
@@ -5272,14 +5075,14 @@
                                 </p:cTn>
                               </p:par>
                               <p:par>
-                                <p:cTn id="80" presetID="10" presetClass="entr" presetSubtype="0" fill="hold" grpId="0" nodeType="withEffect">
+                                <p:cTn id="70" presetID="10" presetClass="entr" presetSubtype="0" fill="hold" grpId="0" nodeType="withEffect">
                                   <p:stCondLst>
                                     <p:cond delay="0"/>
                                   </p:stCondLst>
                                   <p:childTnLst>
                                     <p:set>
                                       <p:cBhvr>
-                                        <p:cTn id="81" dur="1" fill="hold">
+                                        <p:cTn id="71" dur="1" fill="hold">
                                           <p:stCondLst>
                                             <p:cond delay="0"/>
                                           </p:stCondLst>
@@ -5297,7 +5100,7 @@
                                     </p:set>
                                     <p:animEffect transition="in" filter="fade">
                                       <p:cBhvr>
-                                        <p:cTn id="82" dur="500"/>
+                                        <p:cTn id="72" dur="500"/>
                                         <p:tgtEl>
                                           <p:spTgt spid="50"/>
                                         </p:tgtEl>
@@ -5307,14 +5110,14 @@
                                 </p:cTn>
                               </p:par>
                               <p:par>
-                                <p:cTn id="83" presetID="10" presetClass="entr" presetSubtype="0" fill="hold" nodeType="withEffect">
+                                <p:cTn id="73" presetID="10" presetClass="entr" presetSubtype="0" fill="hold" nodeType="withEffect">
                                   <p:stCondLst>
                                     <p:cond delay="0"/>
                                   </p:stCondLst>
                                   <p:childTnLst>
                                     <p:set>
                                       <p:cBhvr>
-                                        <p:cTn id="84" dur="1" fill="hold">
+                                        <p:cTn id="74" dur="1" fill="hold">
                                           <p:stCondLst>
                                             <p:cond delay="0"/>
                                           </p:stCondLst>
@@ -5332,7 +5135,7 @@
                                     </p:set>
                                     <p:animEffect transition="in" filter="fade">
                                       <p:cBhvr>
-                                        <p:cTn id="85" dur="500"/>
+                                        <p:cTn id="75" dur="500"/>
                                         <p:tgtEl>
                                           <p:spTgt spid="42"/>
                                         </p:tgtEl>
@@ -5348,26 +5151,26 @@
                     </p:cTn>
                   </p:par>
                   <p:par>
-                    <p:cTn id="86" fill="hold">
+                    <p:cTn id="76" fill="hold">
                       <p:stCondLst>
                         <p:cond delay="indefinite"/>
                       </p:stCondLst>
                       <p:childTnLst>
                         <p:par>
-                          <p:cTn id="87" fill="hold">
+                          <p:cTn id="77" fill="hold">
                             <p:stCondLst>
                               <p:cond delay="0"/>
                             </p:stCondLst>
                             <p:childTnLst>
                               <p:par>
-                                <p:cTn id="88" presetID="10" presetClass="entr" presetSubtype="0" fill="hold" grpId="0" nodeType="clickEffect">
+                                <p:cTn id="78" presetID="10" presetClass="entr" presetSubtype="0" fill="hold" grpId="0" nodeType="clickEffect">
                                   <p:stCondLst>
                                     <p:cond delay="0"/>
                                   </p:stCondLst>
                                   <p:childTnLst>
                                     <p:set>
                                       <p:cBhvr>
-                                        <p:cTn id="89" dur="1" fill="hold">
+                                        <p:cTn id="79" dur="1" fill="hold">
                                           <p:stCondLst>
                                             <p:cond delay="0"/>
                                           </p:stCondLst>
@@ -5385,7 +5188,7 @@
                                     </p:set>
                                     <p:animEffect transition="in" filter="fade">
                                       <p:cBhvr>
-                                        <p:cTn id="90" dur="500"/>
+                                        <p:cTn id="80" dur="500"/>
                                         <p:tgtEl>
                                           <p:spTgt spid="55"/>
                                         </p:tgtEl>
@@ -5395,14 +5198,14 @@
                                 </p:cTn>
                               </p:par>
                               <p:par>
-                                <p:cTn id="91" presetID="10" presetClass="entr" presetSubtype="0" fill="hold" nodeType="withEffect">
+                                <p:cTn id="81" presetID="10" presetClass="entr" presetSubtype="0" fill="hold" nodeType="withEffect">
                                   <p:stCondLst>
                                     <p:cond delay="0"/>
                                   </p:stCondLst>
                                   <p:childTnLst>
                                     <p:set>
                                       <p:cBhvr>
-                                        <p:cTn id="92" dur="1" fill="hold">
+                                        <p:cTn id="82" dur="1" fill="hold">
                                           <p:stCondLst>
                                             <p:cond delay="0"/>
                                           </p:stCondLst>
@@ -5420,7 +5223,7 @@
                                     </p:set>
                                     <p:animEffect transition="in" filter="fade">
                                       <p:cBhvr>
-                                        <p:cTn id="93" dur="500"/>
+                                        <p:cTn id="83" dur="500"/>
                                         <p:tgtEl>
                                           <p:spTgt spid="56"/>
                                         </p:tgtEl>
@@ -5430,14 +5233,14 @@
                                 </p:cTn>
                               </p:par>
                               <p:par>
-                                <p:cTn id="94" presetID="10" presetClass="entr" presetSubtype="0" fill="hold" grpId="0" nodeType="withEffect">
+                                <p:cTn id="84" presetID="10" presetClass="entr" presetSubtype="0" fill="hold" grpId="0" nodeType="withEffect">
                                   <p:stCondLst>
                                     <p:cond delay="0"/>
                                   </p:stCondLst>
                                   <p:childTnLst>
                                     <p:set>
                                       <p:cBhvr>
-                                        <p:cTn id="95" dur="1" fill="hold">
+                                        <p:cTn id="85" dur="1" fill="hold">
                                           <p:stCondLst>
                                             <p:cond delay="0"/>
                                           </p:stCondLst>
@@ -5455,7 +5258,7 @@
                                     </p:set>
                                     <p:animEffect transition="in" filter="fade">
                                       <p:cBhvr>
-                                        <p:cTn id="96" dur="500"/>
+                                        <p:cTn id="86" dur="500"/>
                                         <p:tgtEl>
                                           <p:spTgt spid="60"/>
                                         </p:tgtEl>
@@ -5468,20 +5271,20 @@
                           </p:cTn>
                         </p:par>
                         <p:par>
-                          <p:cTn id="97" fill="hold">
+                          <p:cTn id="87" fill="hold">
                             <p:stCondLst>
                               <p:cond delay="500"/>
                             </p:stCondLst>
                             <p:childTnLst>
                               <p:par>
-                                <p:cTn id="98" presetID="10" presetClass="entr" presetSubtype="0" fill="hold" grpId="0" nodeType="afterEffect">
+                                <p:cTn id="88" presetID="10" presetClass="entr" presetSubtype="0" fill="hold" grpId="0" nodeType="afterEffect">
                                   <p:stCondLst>
                                     <p:cond delay="0"/>
                                   </p:stCondLst>
                                   <p:childTnLst>
                                     <p:set>
                                       <p:cBhvr>
-                                        <p:cTn id="99" dur="1" fill="hold">
+                                        <p:cTn id="89" dur="1" fill="hold">
                                           <p:stCondLst>
                                             <p:cond delay="0"/>
                                           </p:stCondLst>
@@ -5499,9 +5302,132 @@
                                     </p:set>
                                     <p:animEffect transition="in" filter="fade">
                                       <p:cBhvr>
-                                        <p:cTn id="100" dur="500"/>
+                                        <p:cTn id="90" dur="500"/>
                                         <p:tgtEl>
                                           <p:spTgt spid="53"/>
+                                        </p:tgtEl>
+                                      </p:cBhvr>
+                                    </p:animEffect>
+                                  </p:childTnLst>
+                                </p:cTn>
+                              </p:par>
+                            </p:childTnLst>
+                          </p:cTn>
+                        </p:par>
+                      </p:childTnLst>
+                    </p:cTn>
+                  </p:par>
+                  <p:par>
+                    <p:cTn id="91" fill="hold">
+                      <p:stCondLst>
+                        <p:cond delay="indefinite"/>
+                      </p:stCondLst>
+                      <p:childTnLst>
+                        <p:par>
+                          <p:cTn id="92" fill="hold">
+                            <p:stCondLst>
+                              <p:cond delay="0"/>
+                            </p:stCondLst>
+                            <p:childTnLst>
+                              <p:par>
+                                <p:cTn id="93" presetID="10" presetClass="entr" presetSubtype="0" fill="hold" nodeType="clickEffect">
+                                  <p:stCondLst>
+                                    <p:cond delay="0"/>
+                                  </p:stCondLst>
+                                  <p:childTnLst>
+                                    <p:set>
+                                      <p:cBhvr>
+                                        <p:cTn id="94" dur="1" fill="hold">
+                                          <p:stCondLst>
+                                            <p:cond delay="0"/>
+                                          </p:stCondLst>
+                                        </p:cTn>
+                                        <p:tgtEl>
+                                          <p:spTgt spid="39"/>
+                                        </p:tgtEl>
+                                        <p:attrNameLst>
+                                          <p:attrName>style.visibility</p:attrName>
+                                        </p:attrNameLst>
+                                      </p:cBhvr>
+                                      <p:to>
+                                        <p:strVal val="visible"/>
+                                      </p:to>
+                                    </p:set>
+                                    <p:animEffect transition="in" filter="fade">
+                                      <p:cBhvr>
+                                        <p:cTn id="95" dur="500"/>
+                                        <p:tgtEl>
+                                          <p:spTgt spid="39"/>
+                                        </p:tgtEl>
+                                      </p:cBhvr>
+                                    </p:animEffect>
+                                  </p:childTnLst>
+                                </p:cTn>
+                              </p:par>
+                              <p:par>
+                                <p:cTn id="96" presetID="10" presetClass="entr" presetSubtype="0" fill="hold" nodeType="withEffect">
+                                  <p:stCondLst>
+                                    <p:cond delay="0"/>
+                                  </p:stCondLst>
+                                  <p:childTnLst>
+                                    <p:set>
+                                      <p:cBhvr>
+                                        <p:cTn id="97" dur="1" fill="hold">
+                                          <p:stCondLst>
+                                            <p:cond delay="0"/>
+                                          </p:stCondLst>
+                                        </p:cTn>
+                                        <p:tgtEl>
+                                          <p:spTgt spid="37"/>
+                                        </p:tgtEl>
+                                        <p:attrNameLst>
+                                          <p:attrName>style.visibility</p:attrName>
+                                        </p:attrNameLst>
+                                      </p:cBhvr>
+                                      <p:to>
+                                        <p:strVal val="visible"/>
+                                      </p:to>
+                                    </p:set>
+                                    <p:animEffect transition="in" filter="fade">
+                                      <p:cBhvr>
+                                        <p:cTn id="98" dur="500"/>
+                                        <p:tgtEl>
+                                          <p:spTgt spid="37"/>
+                                        </p:tgtEl>
+                                      </p:cBhvr>
+                                    </p:animEffect>
+                                  </p:childTnLst>
+                                </p:cTn>
+                              </p:par>
+                              <p:par>
+                                <p:cTn id="99" presetID="10" presetClass="entr" presetSubtype="0" fill="hold" grpId="0" nodeType="withEffect">
+                                  <p:stCondLst>
+                                    <p:cond delay="0"/>
+                                  </p:stCondLst>
+                                  <p:childTnLst>
+                                    <p:set>
+                                      <p:cBhvr>
+                                        <p:cTn id="100" dur="1" fill="hold">
+                                          <p:stCondLst>
+                                            <p:cond delay="0"/>
+                                          </p:stCondLst>
+                                        </p:cTn>
+                                        <p:tgtEl>
+                                          <p:spTgt spid="36"/>
+                                        </p:tgtEl>
+                                        <p:attrNameLst>
+                                          <p:attrName>style.visibility</p:attrName>
+                                        </p:attrNameLst>
+                                      </p:cBhvr>
+                                      <p:to>
+                                        <p:strVal val="visible"/>
+                                      </p:to>
+                                    </p:set>
+                                    <p:animEffect transition="in" filter="fade">
+                                      <p:cBhvr>
+                                        <p:cTn id="101" dur="500"/>
+                                        <p:tgtEl>
+                                          <p:spTgt spid="36"/>
                                         </p:tgtEl>
                                       </p:cBhvr>
                                     </p:animEffect>
@@ -5550,12 +5476,10 @@
       <p:bldP spid="55" grpId="0" animBg="1"/>
       <p:bldP spid="60" grpId="0"/>
       <p:bldP spid="67" grpId="0" animBg="1"/>
-      <p:bldP spid="69" grpId="0" animBg="1"/>
-      <p:bldP spid="71" grpId="0"/>
       <p:bldP spid="73" grpId="0" animBg="1"/>
       <p:bldP spid="74" grpId="0"/>
-      <p:bldP spid="80" grpId="0"/>
       <p:bldP spid="35" grpId="0"/>
+      <p:bldP spid="36" grpId="0" animBg="1"/>
     </p:bldLst>
   </p:timing>
 </p:sld>

</xml_diff>

<commit_message>
Revert "uml/CD/combine/basic: update question description and hint"
This reverts commit 5f9c850a9d7567481d3284de026da5145d694245.
</commit_message>
<xml_diff>
--- a/diagrams/uml/classDiagrams/combine/objectDiagramsForClassDiagramExtra.pptx
+++ b/diagrams/uml/classDiagrams/combine/objectDiagramsForClassDiagramExtra.pptx
@@ -304,7 +304,7 @@
           <a:p>
             <a:fld id="{A0F86979-30DA-49EE-A740-32EBA6D2B7DE}" type="datetimeFigureOut">
               <a:rPr lang="en-SG" smtClean="0"/>
-              <a:t>10/9/2018</a:t>
+              <a:t>5/9/2017</a:t>
             </a:fld>
             <a:endParaRPr lang="en-SG"/>
           </a:p>
@@ -474,7 +474,7 @@
           <a:p>
             <a:fld id="{A0F86979-30DA-49EE-A740-32EBA6D2B7DE}" type="datetimeFigureOut">
               <a:rPr lang="en-SG" smtClean="0"/>
-              <a:t>10/9/2018</a:t>
+              <a:t>5/9/2017</a:t>
             </a:fld>
             <a:endParaRPr lang="en-SG"/>
           </a:p>
@@ -654,7 +654,7 @@
           <a:p>
             <a:fld id="{A0F86979-30DA-49EE-A740-32EBA6D2B7DE}" type="datetimeFigureOut">
               <a:rPr lang="en-SG" smtClean="0"/>
-              <a:t>10/9/2018</a:t>
+              <a:t>5/9/2017</a:t>
             </a:fld>
             <a:endParaRPr lang="en-SG"/>
           </a:p>
@@ -824,7 +824,7 @@
           <a:p>
             <a:fld id="{A0F86979-30DA-49EE-A740-32EBA6D2B7DE}" type="datetimeFigureOut">
               <a:rPr lang="en-SG" smtClean="0"/>
-              <a:t>10/9/2018</a:t>
+              <a:t>5/9/2017</a:t>
             </a:fld>
             <a:endParaRPr lang="en-SG"/>
           </a:p>
@@ -1070,7 +1070,7 @@
           <a:p>
             <a:fld id="{A0F86979-30DA-49EE-A740-32EBA6D2B7DE}" type="datetimeFigureOut">
               <a:rPr lang="en-SG" smtClean="0"/>
-              <a:t>10/9/2018</a:t>
+              <a:t>5/9/2017</a:t>
             </a:fld>
             <a:endParaRPr lang="en-SG"/>
           </a:p>
@@ -1358,7 +1358,7 @@
           <a:p>
             <a:fld id="{A0F86979-30DA-49EE-A740-32EBA6D2B7DE}" type="datetimeFigureOut">
               <a:rPr lang="en-SG" smtClean="0"/>
-              <a:t>10/9/2018</a:t>
+              <a:t>5/9/2017</a:t>
             </a:fld>
             <a:endParaRPr lang="en-SG"/>
           </a:p>
@@ -1780,7 +1780,7 @@
           <a:p>
             <a:fld id="{A0F86979-30DA-49EE-A740-32EBA6D2B7DE}" type="datetimeFigureOut">
               <a:rPr lang="en-SG" smtClean="0"/>
-              <a:t>10/9/2018</a:t>
+              <a:t>5/9/2017</a:t>
             </a:fld>
             <a:endParaRPr lang="en-SG"/>
           </a:p>
@@ -1898,7 +1898,7 @@
           <a:p>
             <a:fld id="{A0F86979-30DA-49EE-A740-32EBA6D2B7DE}" type="datetimeFigureOut">
               <a:rPr lang="en-SG" smtClean="0"/>
-              <a:t>10/9/2018</a:t>
+              <a:t>5/9/2017</a:t>
             </a:fld>
             <a:endParaRPr lang="en-SG"/>
           </a:p>
@@ -1993,7 +1993,7 @@
           <a:p>
             <a:fld id="{A0F86979-30DA-49EE-A740-32EBA6D2B7DE}" type="datetimeFigureOut">
               <a:rPr lang="en-SG" smtClean="0"/>
-              <a:t>10/9/2018</a:t>
+              <a:t>5/9/2017</a:t>
             </a:fld>
             <a:endParaRPr lang="en-SG"/>
           </a:p>
@@ -2270,7 +2270,7 @@
           <a:p>
             <a:fld id="{A0F86979-30DA-49EE-A740-32EBA6D2B7DE}" type="datetimeFigureOut">
               <a:rPr lang="en-SG" smtClean="0"/>
-              <a:t>10/9/2018</a:t>
+              <a:t>5/9/2017</a:t>
             </a:fld>
             <a:endParaRPr lang="en-SG"/>
           </a:p>
@@ -2523,7 +2523,7 @@
           <a:p>
             <a:fld id="{A0F86979-30DA-49EE-A740-32EBA6D2B7DE}" type="datetimeFigureOut">
               <a:rPr lang="en-SG" smtClean="0"/>
-              <a:t>10/9/2018</a:t>
+              <a:t>5/9/2017</a:t>
             </a:fld>
             <a:endParaRPr lang="en-SG"/>
           </a:p>
@@ -2736,7 +2736,7 @@
           <a:p>
             <a:fld id="{A0F86979-30DA-49EE-A740-32EBA6D2B7DE}" type="datetimeFigureOut">
               <a:rPr lang="en-SG" smtClean="0"/>
-              <a:t>10/9/2018</a:t>
+              <a:t>5/9/2017</a:t>
             </a:fld>
             <a:endParaRPr lang="en-SG"/>
           </a:p>
@@ -3149,7 +3149,11 @@
             <a:pPr algn="ctr"/>
             <a:r>
               <a:rPr lang="en-US" sz="1400" u="sng" dirty="0" smtClean="0"/>
-              <a:t>:Address</a:t>
+              <a:t>:</a:t>
+            </a:r>
+            <a:r>
+              <a:rPr lang="en-US" sz="1400" u="sng" dirty="0" smtClean="0"/>
+              <a:t>Address</a:t>
             </a:r>
             <a:endParaRPr lang="en-SG" sz="1400" u="sng" dirty="0"/>
           </a:p>
@@ -4014,6 +4018,120 @@
           </a:p>
         </p:txBody>
       </p:sp>
+      <p:sp>
+        <p:nvSpPr>
+          <p:cNvPr id="69" name="Rectangle 68"/>
+          <p:cNvSpPr/>
+          <p:nvPr/>
+        </p:nvSpPr>
+        <p:spPr>
+          <a:xfrm>
+            <a:off x="6252275" y="5547066"/>
+            <a:ext cx="1484233" cy="314102"/>
+          </a:xfrm>
+          <a:prstGeom prst="rect">
+            <a:avLst/>
+          </a:prstGeom>
+        </p:spPr>
+        <p:style>
+          <a:lnRef idx="2">
+            <a:schemeClr val="accent4">
+              <a:shade val="50000"/>
+            </a:schemeClr>
+          </a:lnRef>
+          <a:fillRef idx="1">
+            <a:schemeClr val="accent4"/>
+          </a:fillRef>
+          <a:effectRef idx="0">
+            <a:schemeClr val="accent4"/>
+          </a:effectRef>
+          <a:fontRef idx="minor">
+            <a:schemeClr val="lt1"/>
+          </a:fontRef>
+        </p:style>
+        <p:txBody>
+          <a:bodyPr rtlCol="0" anchor="ctr"/>
+          <a:lstStyle/>
+          <a:p>
+            <a:pPr algn="ctr"/>
+            <a:r>
+              <a:rPr lang="en-US" sz="1400" u="sng" dirty="0" smtClean="0"/>
+              <a:t>:Address</a:t>
+            </a:r>
+            <a:endParaRPr lang="en-SG" sz="1400" u="sng" dirty="0"/>
+          </a:p>
+        </p:txBody>
+      </p:sp>
+      <p:cxnSp>
+        <p:nvCxnSpPr>
+          <p:cNvPr id="70" name="Elbow Connector 69"/>
+          <p:cNvCxnSpPr>
+            <a:stCxn id="73" idx="3"/>
+            <a:endCxn id="69" idx="1"/>
+          </p:cNvCxnSpPr>
+          <p:nvPr/>
+        </p:nvCxnSpPr>
+        <p:spPr>
+          <a:xfrm flipV="1">
+            <a:off x="5292080" y="5704117"/>
+            <a:ext cx="960195" cy="1910"/>
+          </a:xfrm>
+          <a:prstGeom prst="bentConnector3">
+            <a:avLst>
+              <a:gd name="adj1" fmla="val 50000"/>
+            </a:avLst>
+          </a:prstGeom>
+          <a:ln>
+            <a:tailEnd type="arrow"/>
+          </a:ln>
+        </p:spPr>
+        <p:style>
+          <a:lnRef idx="2">
+            <a:schemeClr val="accent2">
+              <a:shade val="50000"/>
+            </a:schemeClr>
+          </a:lnRef>
+          <a:fillRef idx="1">
+            <a:schemeClr val="accent2"/>
+          </a:fillRef>
+          <a:effectRef idx="0">
+            <a:schemeClr val="accent2"/>
+          </a:effectRef>
+          <a:fontRef idx="minor">
+            <a:schemeClr val="lt1"/>
+          </a:fontRef>
+        </p:style>
+      </p:cxnSp>
+      <p:sp>
+        <p:nvSpPr>
+          <p:cNvPr id="71" name="TextBox 70"/>
+          <p:cNvSpPr txBox="1"/>
+          <p:nvPr/>
+        </p:nvSpPr>
+        <p:spPr>
+          <a:xfrm>
+            <a:off x="5696677" y="5716120"/>
+            <a:ext cx="697453" cy="307777"/>
+          </a:xfrm>
+          <a:prstGeom prst="rect">
+            <a:avLst/>
+          </a:prstGeom>
+          <a:noFill/>
+        </p:spPr>
+        <p:txBody>
+          <a:bodyPr wrap="square" rtlCol="0">
+            <a:spAutoFit/>
+          </a:bodyPr>
+          <a:lstStyle/>
+          <a:p>
+            <a:r>
+              <a:rPr lang="en-US" sz="1400" dirty="0" smtClean="0"/>
+              <a:t>home</a:t>
+            </a:r>
+            <a:endParaRPr lang="en-SG" sz="1400" dirty="0"/>
+          </a:p>
+        </p:txBody>
+      </p:sp>
       <p:cxnSp>
         <p:nvCxnSpPr>
           <p:cNvPr id="72" name="Elbow Connector 71"/>
@@ -4128,139 +4246,23 @@
           </a:p>
         </p:txBody>
       </p:sp>
-      <p:sp>
-        <p:nvSpPr>
-          <p:cNvPr id="35" name="TextBox 34"/>
-          <p:cNvSpPr txBox="1"/>
-          <p:nvPr/>
-        </p:nvSpPr>
-        <p:spPr>
-          <a:xfrm>
-            <a:off x="-80466" y="1973888"/>
-            <a:ext cx="948988" cy="307777"/>
-          </a:xfrm>
-          <a:prstGeom prst="rect">
-            <a:avLst/>
-          </a:prstGeom>
-          <a:noFill/>
-        </p:spPr>
-        <p:txBody>
-          <a:bodyPr wrap="square" rtlCol="0">
-            <a:spAutoFit/>
-          </a:bodyPr>
-          <a:lstStyle/>
-          <a:p>
-            <a:r>
-              <a:rPr lang="en-US" sz="1400" dirty="0" smtClean="0"/>
-              <a:t>guardian</a:t>
-            </a:r>
-            <a:endParaRPr lang="en-SG" sz="1400" dirty="0"/>
-          </a:p>
-        </p:txBody>
-      </p:sp>
-      <p:sp>
-        <p:nvSpPr>
-          <p:cNvPr id="36" name="Rectangle 35"/>
-          <p:cNvSpPr/>
-          <p:nvPr/>
-        </p:nvSpPr>
-        <p:spPr>
-          <a:xfrm>
-            <a:off x="3761185" y="6195329"/>
-            <a:ext cx="1539773" cy="310743"/>
-          </a:xfrm>
-          <a:prstGeom prst="rect">
-            <a:avLst/>
-          </a:prstGeom>
-        </p:spPr>
-        <p:style>
-          <a:lnRef idx="2">
-            <a:schemeClr val="accent5">
-              <a:shade val="50000"/>
-            </a:schemeClr>
-          </a:lnRef>
-          <a:fillRef idx="1">
-            <a:schemeClr val="accent5"/>
-          </a:fillRef>
-          <a:effectRef idx="0">
-            <a:schemeClr val="accent5"/>
-          </a:effectRef>
-          <a:fontRef idx="minor">
-            <a:schemeClr val="lt1"/>
-          </a:fontRef>
-        </p:style>
-        <p:txBody>
-          <a:bodyPr rtlCol="0" anchor="ctr"/>
-          <a:lstStyle/>
-          <a:p>
-            <a:pPr algn="ctr"/>
-            <a:r>
-              <a:rPr lang="en-US" sz="1400" u="sng" dirty="0" smtClean="0"/>
-              <a:t>:</a:t>
-            </a:r>
-            <a:r>
-              <a:rPr lang="en-US" sz="1400" u="sng" dirty="0" err="1" smtClean="0"/>
-              <a:t>ContactNumber</a:t>
-            </a:r>
-            <a:endParaRPr lang="en-SG" sz="1400" u="sng" dirty="0"/>
-          </a:p>
-        </p:txBody>
-      </p:sp>
       <p:cxnSp>
         <p:nvCxnSpPr>
-          <p:cNvPr id="37" name="Elbow Connector 36"/>
+          <p:cNvPr id="78" name="Elbow Connector 77"/>
           <p:cNvCxnSpPr>
-            <a:stCxn id="67" idx="2"/>
-            <a:endCxn id="36" idx="1"/>
+            <a:stCxn id="67" idx="0"/>
+            <a:endCxn id="69" idx="0"/>
           </p:cNvCxnSpPr>
           <p:nvPr/>
         </p:nvCxnSpPr>
         <p:spPr>
-          <a:xfrm rot="16200000" flipH="1">
-            <a:off x="2301004" y="4890520"/>
-            <a:ext cx="480692" cy="2439669"/>
-          </a:xfrm>
-          <a:prstGeom prst="bentConnector2">
-            <a:avLst/>
-          </a:prstGeom>
-          <a:ln>
-            <a:tailEnd type="arrow"/>
-          </a:ln>
-        </p:spPr>
-        <p:style>
-          <a:lnRef idx="2">
-            <a:schemeClr val="accent2">
-              <a:shade val="50000"/>
-            </a:schemeClr>
-          </a:lnRef>
-          <a:fillRef idx="1">
-            <a:schemeClr val="accent2"/>
-          </a:fillRef>
-          <a:effectRef idx="0">
-            <a:schemeClr val="accent2"/>
-          </a:effectRef>
-          <a:fontRef idx="minor">
-            <a:schemeClr val="lt1"/>
-          </a:fontRef>
-        </p:style>
-      </p:cxnSp>
-      <p:cxnSp>
-        <p:nvCxnSpPr>
-          <p:cNvPr id="39" name="Elbow Connector 38"/>
-          <p:cNvCxnSpPr>
-            <a:stCxn id="73" idx="2"/>
-            <a:endCxn id="36" idx="0"/>
-          </p:cNvCxnSpPr>
-          <p:nvPr/>
-        </p:nvCxnSpPr>
-        <p:spPr>
-          <a:xfrm rot="5400000">
-            <a:off x="4366569" y="6025901"/>
-            <a:ext cx="333931" cy="4924"/>
+          <a:xfrm rot="5400000" flipH="1" flipV="1">
+            <a:off x="4151854" y="2716728"/>
+            <a:ext cx="12200" cy="5672876"/>
           </a:xfrm>
           <a:prstGeom prst="bentConnector3">
             <a:avLst>
-              <a:gd name="adj1" fmla="val 50000"/>
+              <a:gd name="adj1" fmla="val 1973770"/>
             </a:avLst>
           </a:prstGeom>
           <a:ln>
@@ -4284,6 +4286,66 @@
           </a:fontRef>
         </p:style>
       </p:cxnSp>
+      <p:sp>
+        <p:nvSpPr>
+          <p:cNvPr id="80" name="TextBox 79"/>
+          <p:cNvSpPr txBox="1"/>
+          <p:nvPr/>
+        </p:nvSpPr>
+        <p:spPr>
+          <a:xfrm>
+            <a:off x="7079960" y="5204031"/>
+            <a:ext cx="697453" cy="307777"/>
+          </a:xfrm>
+          <a:prstGeom prst="rect">
+            <a:avLst/>
+          </a:prstGeom>
+          <a:noFill/>
+        </p:spPr>
+        <p:txBody>
+          <a:bodyPr wrap="square" rtlCol="0">
+            <a:spAutoFit/>
+          </a:bodyPr>
+          <a:lstStyle/>
+          <a:p>
+            <a:r>
+              <a:rPr lang="en-US" sz="1400" dirty="0" smtClean="0"/>
+              <a:t>home</a:t>
+            </a:r>
+            <a:endParaRPr lang="en-SG" sz="1400" dirty="0"/>
+          </a:p>
+        </p:txBody>
+      </p:sp>
+      <p:sp>
+        <p:nvSpPr>
+          <p:cNvPr id="35" name="TextBox 34"/>
+          <p:cNvSpPr txBox="1"/>
+          <p:nvPr/>
+        </p:nvSpPr>
+        <p:spPr>
+          <a:xfrm>
+            <a:off x="-80466" y="1973888"/>
+            <a:ext cx="948988" cy="307777"/>
+          </a:xfrm>
+          <a:prstGeom prst="rect">
+            <a:avLst/>
+          </a:prstGeom>
+          <a:noFill/>
+        </p:spPr>
+        <p:txBody>
+          <a:bodyPr wrap="square" rtlCol="0">
+            <a:spAutoFit/>
+          </a:bodyPr>
+          <a:lstStyle/>
+          <a:p>
+            <a:r>
+              <a:rPr lang="en-US" sz="1400" dirty="0" smtClean="0"/>
+              <a:t>guardian</a:t>
+            </a:r>
+            <a:endParaRPr lang="en-SG" sz="1400" dirty="0"/>
+          </a:p>
+        </p:txBody>
+      </p:sp>
     </p:spTree>
     <p:extLst>
       <p:ext uri="{BB962C8B-B14F-4D97-AF65-F5344CB8AC3E}">
@@ -4345,7 +4407,7 @@
                                 </p:cTn>
                               </p:par>
                               <p:par>
-                                <p:cTn id="7" presetID="1" presetClass="exit" presetSubtype="0" fill="hold" nodeType="withEffect">
+                                <p:cTn id="7" presetID="1" presetClass="exit" presetSubtype="0" fill="hold" grpId="0" nodeType="withEffect">
                                   <p:stCondLst>
                                     <p:cond delay="0"/>
                                   </p:stCondLst>
@@ -4358,7 +4420,7 @@
                                           </p:stCondLst>
                                         </p:cTn>
                                         <p:tgtEl>
-                                          <p:spTgt spid="72"/>
+                                          <p:spTgt spid="69"/>
                                         </p:tgtEl>
                                         <p:attrNameLst>
                                           <p:attrName>style.visibility</p:attrName>
@@ -4372,7 +4434,7 @@
                                 </p:cTn>
                               </p:par>
                               <p:par>
-                                <p:cTn id="9" presetID="1" presetClass="exit" presetSubtype="0" fill="hold" grpId="0" nodeType="withEffect">
+                                <p:cTn id="9" presetID="1" presetClass="exit" presetSubtype="0" fill="hold" nodeType="withEffect">
                                   <p:stCondLst>
                                     <p:cond delay="0"/>
                                   </p:stCondLst>
@@ -4385,7 +4447,7 @@
                                           </p:stCondLst>
                                         </p:cTn>
                                         <p:tgtEl>
-                                          <p:spTgt spid="73"/>
+                                          <p:spTgt spid="70"/>
                                         </p:tgtEl>
                                         <p:attrNameLst>
                                           <p:attrName>style.visibility</p:attrName>
@@ -4412,7 +4474,142 @@
                                           </p:stCondLst>
                                         </p:cTn>
                                         <p:tgtEl>
+                                          <p:spTgt spid="71"/>
+                                        </p:tgtEl>
+                                        <p:attrNameLst>
+                                          <p:attrName>style.visibility</p:attrName>
+                                        </p:attrNameLst>
+                                      </p:cBhvr>
+                                      <p:to>
+                                        <p:strVal val="hidden"/>
+                                      </p:to>
+                                    </p:set>
+                                  </p:childTnLst>
+                                </p:cTn>
+                              </p:par>
+                              <p:par>
+                                <p:cTn id="13" presetID="1" presetClass="exit" presetSubtype="0" fill="hold" nodeType="withEffect">
+                                  <p:stCondLst>
+                                    <p:cond delay="0"/>
+                                  </p:stCondLst>
+                                  <p:childTnLst>
+                                    <p:set>
+                                      <p:cBhvr>
+                                        <p:cTn id="14" dur="1" fill="hold">
+                                          <p:stCondLst>
+                                            <p:cond delay="0"/>
+                                          </p:stCondLst>
+                                        </p:cTn>
+                                        <p:tgtEl>
+                                          <p:spTgt spid="72"/>
+                                        </p:tgtEl>
+                                        <p:attrNameLst>
+                                          <p:attrName>style.visibility</p:attrName>
+                                        </p:attrNameLst>
+                                      </p:cBhvr>
+                                      <p:to>
+                                        <p:strVal val="hidden"/>
+                                      </p:to>
+                                    </p:set>
+                                  </p:childTnLst>
+                                </p:cTn>
+                              </p:par>
+                              <p:par>
+                                <p:cTn id="15" presetID="1" presetClass="exit" presetSubtype="0" fill="hold" grpId="0" nodeType="withEffect">
+                                  <p:stCondLst>
+                                    <p:cond delay="0"/>
+                                  </p:stCondLst>
+                                  <p:childTnLst>
+                                    <p:set>
+                                      <p:cBhvr>
+                                        <p:cTn id="16" dur="1" fill="hold">
+                                          <p:stCondLst>
+                                            <p:cond delay="0"/>
+                                          </p:stCondLst>
+                                        </p:cTn>
+                                        <p:tgtEl>
+                                          <p:spTgt spid="73"/>
+                                        </p:tgtEl>
+                                        <p:attrNameLst>
+                                          <p:attrName>style.visibility</p:attrName>
+                                        </p:attrNameLst>
+                                      </p:cBhvr>
+                                      <p:to>
+                                        <p:strVal val="hidden"/>
+                                      </p:to>
+                                    </p:set>
+                                  </p:childTnLst>
+                                </p:cTn>
+                              </p:par>
+                              <p:par>
+                                <p:cTn id="17" presetID="1" presetClass="exit" presetSubtype="0" fill="hold" grpId="0" nodeType="withEffect">
+                                  <p:stCondLst>
+                                    <p:cond delay="0"/>
+                                  </p:stCondLst>
+                                  <p:childTnLst>
+                                    <p:set>
+                                      <p:cBhvr>
+                                        <p:cTn id="18" dur="1" fill="hold">
+                                          <p:stCondLst>
+                                            <p:cond delay="0"/>
+                                          </p:stCondLst>
+                                        </p:cTn>
+                                        <p:tgtEl>
                                           <p:spTgt spid="74"/>
+                                        </p:tgtEl>
+                                        <p:attrNameLst>
+                                          <p:attrName>style.visibility</p:attrName>
+                                        </p:attrNameLst>
+                                      </p:cBhvr>
+                                      <p:to>
+                                        <p:strVal val="hidden"/>
+                                      </p:to>
+                                    </p:set>
+                                  </p:childTnLst>
+                                </p:cTn>
+                              </p:par>
+                              <p:par>
+                                <p:cTn id="19" presetID="1" presetClass="exit" presetSubtype="0" fill="hold" nodeType="withEffect">
+                                  <p:stCondLst>
+                                    <p:cond delay="0"/>
+                                  </p:stCondLst>
+                                  <p:childTnLst>
+                                    <p:set>
+                                      <p:cBhvr>
+                                        <p:cTn id="20" dur="1" fill="hold">
+                                          <p:stCondLst>
+                                            <p:cond delay="0"/>
+                                          </p:stCondLst>
+                                        </p:cTn>
+                                        <p:tgtEl>
+                                          <p:spTgt spid="78"/>
+                                        </p:tgtEl>
+                                        <p:attrNameLst>
+                                          <p:attrName>style.visibility</p:attrName>
+                                        </p:attrNameLst>
+                                      </p:cBhvr>
+                                      <p:to>
+                                        <p:strVal val="hidden"/>
+                                      </p:to>
+                                    </p:set>
+                                  </p:childTnLst>
+                                </p:cTn>
+                              </p:par>
+                              <p:par>
+                                <p:cTn id="21" presetID="1" presetClass="exit" presetSubtype="0" fill="hold" grpId="0" nodeType="withEffect">
+                                  <p:stCondLst>
+                                    <p:cond delay="0"/>
+                                  </p:stCondLst>
+                                  <p:childTnLst>
+                                    <p:set>
+                                      <p:cBhvr>
+                                        <p:cTn id="22" dur="1" fill="hold">
+                                          <p:stCondLst>
+                                            <p:cond delay="0"/>
+                                          </p:stCondLst>
+                                        </p:cTn>
+                                        <p:tgtEl>
+                                          <p:spTgt spid="80"/>
                                         </p:tgtEl>
                                         <p:attrNameLst>
                                           <p:attrName>style.visibility</p:attrName>
@@ -4432,26 +4629,26 @@
                     </p:cTn>
                   </p:par>
                   <p:par>
-                    <p:cTn id="13" fill="hold">
+                    <p:cTn id="23" fill="hold">
                       <p:stCondLst>
                         <p:cond delay="indefinite"/>
                       </p:stCondLst>
                       <p:childTnLst>
                         <p:par>
-                          <p:cTn id="14" fill="hold">
+                          <p:cTn id="24" fill="hold">
                             <p:stCondLst>
                               <p:cond delay="0"/>
                             </p:stCondLst>
                             <p:childTnLst>
                               <p:par>
-                                <p:cTn id="15" presetID="10" presetClass="entr" presetSubtype="0" fill="hold" grpId="0" nodeType="clickEffect">
+                                <p:cTn id="25" presetID="10" presetClass="entr" presetSubtype="0" fill="hold" grpId="0" nodeType="clickEffect">
                                   <p:stCondLst>
                                     <p:cond delay="0"/>
                                   </p:stCondLst>
                                   <p:childTnLst>
                                     <p:set>
                                       <p:cBhvr>
-                                        <p:cTn id="16" dur="1" fill="hold">
+                                        <p:cTn id="26" dur="1" fill="hold">
                                           <p:stCondLst>
                                             <p:cond delay="0"/>
                                           </p:stCondLst>
@@ -4469,7 +4666,7 @@
                                     </p:set>
                                     <p:animEffect transition="in" filter="fade">
                                       <p:cBhvr>
-                                        <p:cTn id="17" dur="500"/>
+                                        <p:cTn id="27" dur="500"/>
                                         <p:tgtEl>
                                           <p:spTgt spid="34"/>
                                         </p:tgtEl>
@@ -4479,14 +4676,14 @@
                                 </p:cTn>
                               </p:par>
                               <p:par>
-                                <p:cTn id="18" presetID="10" presetClass="entr" presetSubtype="0" fill="hold" grpId="0" nodeType="withEffect">
+                                <p:cTn id="28" presetID="10" presetClass="entr" presetSubtype="0" fill="hold" grpId="0" nodeType="withEffect">
                                   <p:stCondLst>
                                     <p:cond delay="0"/>
                                   </p:stCondLst>
                                   <p:childTnLst>
                                     <p:set>
                                       <p:cBhvr>
-                                        <p:cTn id="19" dur="1" fill="hold">
+                                        <p:cTn id="29" dur="1" fill="hold">
                                           <p:stCondLst>
                                             <p:cond delay="0"/>
                                           </p:stCondLst>
@@ -4504,7 +4701,7 @@
                                     </p:set>
                                     <p:animEffect transition="in" filter="fade">
                                       <p:cBhvr>
-                                        <p:cTn id="20" dur="500"/>
+                                        <p:cTn id="30" dur="500"/>
                                         <p:tgtEl>
                                           <p:spTgt spid="49"/>
                                         </p:tgtEl>
@@ -4514,14 +4711,14 @@
                                 </p:cTn>
                               </p:par>
                               <p:par>
-                                <p:cTn id="21" presetID="10" presetClass="entr" presetSubtype="0" fill="hold" nodeType="withEffect">
+                                <p:cTn id="31" presetID="10" presetClass="entr" presetSubtype="0" fill="hold" nodeType="withEffect">
                                   <p:stCondLst>
                                     <p:cond delay="0"/>
                                   </p:stCondLst>
                                   <p:childTnLst>
                                     <p:set>
                                       <p:cBhvr>
-                                        <p:cTn id="22" dur="1" fill="hold">
+                                        <p:cTn id="32" dur="1" fill="hold">
                                           <p:stCondLst>
                                             <p:cond delay="0"/>
                                           </p:stCondLst>
@@ -4539,7 +4736,7 @@
                                     </p:set>
                                     <p:animEffect transition="in" filter="fade">
                                       <p:cBhvr>
-                                        <p:cTn id="23" dur="500"/>
+                                        <p:cTn id="33" dur="500"/>
                                         <p:tgtEl>
                                           <p:spTgt spid="54"/>
                                         </p:tgtEl>
@@ -4549,14 +4746,14 @@
                                 </p:cTn>
                               </p:par>
                               <p:par>
-                                <p:cTn id="24" presetID="10" presetClass="entr" presetSubtype="0" fill="hold" nodeType="withEffect">
+                                <p:cTn id="34" presetID="10" presetClass="entr" presetSubtype="0" fill="hold" nodeType="withEffect">
                                   <p:stCondLst>
                                     <p:cond delay="0"/>
                                   </p:stCondLst>
                                   <p:childTnLst>
                                     <p:set>
                                       <p:cBhvr>
-                                        <p:cTn id="25" dur="1" fill="hold">
+                                        <p:cTn id="35" dur="1" fill="hold">
                                           <p:stCondLst>
                                             <p:cond delay="0"/>
                                           </p:stCondLst>
@@ -4574,7 +4771,7 @@
                                     </p:set>
                                     <p:animEffect transition="in" filter="fade">
                                       <p:cBhvr>
-                                        <p:cTn id="26" dur="500"/>
+                                        <p:cTn id="36" dur="500"/>
                                         <p:tgtEl>
                                           <p:spTgt spid="59"/>
                                         </p:tgtEl>
@@ -4584,14 +4781,14 @@
                                 </p:cTn>
                               </p:par>
                               <p:par>
-                                <p:cTn id="27" presetID="10" presetClass="entr" presetSubtype="0" fill="hold" grpId="0" nodeType="withEffect">
+                                <p:cTn id="37" presetID="10" presetClass="entr" presetSubtype="0" fill="hold" grpId="0" nodeType="withEffect">
                                   <p:stCondLst>
                                     <p:cond delay="0"/>
                                   </p:stCondLst>
                                   <p:childTnLst>
                                     <p:set>
                                       <p:cBhvr>
-                                        <p:cTn id="28" dur="1" fill="hold">
+                                        <p:cTn id="38" dur="1" fill="hold">
                                           <p:stCondLst>
                                             <p:cond delay="0"/>
                                           </p:stCondLst>
@@ -4609,7 +4806,7 @@
                                     </p:set>
                                     <p:animEffect transition="in" filter="fade">
                                       <p:cBhvr>
-                                        <p:cTn id="29" dur="500"/>
+                                        <p:cTn id="39" dur="500"/>
                                         <p:tgtEl>
                                           <p:spTgt spid="79"/>
                                         </p:tgtEl>
@@ -4619,14 +4816,14 @@
                                 </p:cTn>
                               </p:par>
                               <p:par>
-                                <p:cTn id="30" presetID="10" presetClass="entr" presetSubtype="0" fill="hold" grpId="0" nodeType="withEffect">
+                                <p:cTn id="40" presetID="10" presetClass="entr" presetSubtype="0" fill="hold" grpId="0" nodeType="withEffect">
                                   <p:stCondLst>
                                     <p:cond delay="0"/>
                                   </p:stCondLst>
                                   <p:childTnLst>
                                     <p:set>
                                       <p:cBhvr>
-                                        <p:cTn id="31" dur="1" fill="hold">
+                                        <p:cTn id="41" dur="1" fill="hold">
                                           <p:stCondLst>
                                             <p:cond delay="0"/>
                                           </p:stCondLst>
@@ -4644,7 +4841,7 @@
                                     </p:set>
                                     <p:animEffect transition="in" filter="fade">
                                       <p:cBhvr>
-                                        <p:cTn id="32" dur="500"/>
+                                        <p:cTn id="42" dur="500"/>
                                         <p:tgtEl>
                                           <p:spTgt spid="23"/>
                                         </p:tgtEl>
@@ -4654,14 +4851,14 @@
                                 </p:cTn>
                               </p:par>
                               <p:par>
-                                <p:cTn id="33" presetID="10" presetClass="entr" presetSubtype="0" fill="hold" nodeType="withEffect">
+                                <p:cTn id="43" presetID="10" presetClass="entr" presetSubtype="0" fill="hold" nodeType="withEffect">
                                   <p:stCondLst>
                                     <p:cond delay="0"/>
                                   </p:stCondLst>
                                   <p:childTnLst>
                                     <p:set>
                                       <p:cBhvr>
-                                        <p:cTn id="34" dur="1" fill="hold">
+                                        <p:cTn id="44" dur="1" fill="hold">
                                           <p:stCondLst>
                                             <p:cond delay="0"/>
                                           </p:stCondLst>
@@ -4679,7 +4876,7 @@
                                     </p:set>
                                     <p:animEffect transition="in" filter="fade">
                                       <p:cBhvr>
-                                        <p:cTn id="35" dur="500"/>
+                                        <p:cTn id="45" dur="500"/>
                                         <p:tgtEl>
                                           <p:spTgt spid="32"/>
                                         </p:tgtEl>
@@ -4689,14 +4886,14 @@
                                 </p:cTn>
                               </p:par>
                               <p:par>
-                                <p:cTn id="36" presetID="10" presetClass="entr" presetSubtype="0" fill="hold" grpId="0" nodeType="withEffect">
+                                <p:cTn id="46" presetID="10" presetClass="entr" presetSubtype="0" fill="hold" grpId="0" nodeType="withEffect">
                                   <p:stCondLst>
                                     <p:cond delay="0"/>
                                   </p:stCondLst>
                                   <p:childTnLst>
                                     <p:set>
                                       <p:cBhvr>
-                                        <p:cTn id="37" dur="1" fill="hold">
+                                        <p:cTn id="47" dur="1" fill="hold">
                                           <p:stCondLst>
                                             <p:cond delay="0"/>
                                           </p:stCondLst>
@@ -4714,7 +4911,7 @@
                                     </p:set>
                                     <p:animEffect transition="in" filter="fade">
                                       <p:cBhvr>
-                                        <p:cTn id="38" dur="500"/>
+                                        <p:cTn id="48" dur="500"/>
                                         <p:tgtEl>
                                           <p:spTgt spid="33"/>
                                         </p:tgtEl>
@@ -4724,14 +4921,14 @@
                                 </p:cTn>
                               </p:par>
                               <p:par>
-                                <p:cTn id="39" presetID="10" presetClass="entr" presetSubtype="0" fill="hold" grpId="0" nodeType="withEffect">
+                                <p:cTn id="49" presetID="10" presetClass="entr" presetSubtype="0" fill="hold" grpId="0" nodeType="withEffect">
                                   <p:stCondLst>
                                     <p:cond delay="0"/>
                                   </p:stCondLst>
                                   <p:childTnLst>
                                     <p:set>
                                       <p:cBhvr>
-                                        <p:cTn id="40" dur="1" fill="hold">
+                                        <p:cTn id="50" dur="1" fill="hold">
                                           <p:stCondLst>
                                             <p:cond delay="0"/>
                                           </p:stCondLst>
@@ -4749,7 +4946,7 @@
                                     </p:set>
                                     <p:animEffect transition="in" filter="fade">
                                       <p:cBhvr>
-                                        <p:cTn id="41" dur="500"/>
+                                        <p:cTn id="51" dur="500"/>
                                         <p:tgtEl>
                                           <p:spTgt spid="58"/>
                                         </p:tgtEl>
@@ -4765,26 +4962,26 @@
                     </p:cTn>
                   </p:par>
                   <p:par>
-                    <p:cTn id="42" fill="hold">
+                    <p:cTn id="52" fill="hold">
                       <p:stCondLst>
                         <p:cond delay="indefinite"/>
                       </p:stCondLst>
                       <p:childTnLst>
                         <p:par>
-                          <p:cTn id="43" fill="hold">
+                          <p:cTn id="53" fill="hold">
                             <p:stCondLst>
                               <p:cond delay="0"/>
                             </p:stCondLst>
                             <p:childTnLst>
                               <p:par>
-                                <p:cTn id="44" presetID="10" presetClass="entr" presetSubtype="0" fill="hold" nodeType="clickEffect">
+                                <p:cTn id="54" presetID="10" presetClass="entr" presetSubtype="0" fill="hold" nodeType="clickEffect">
                                   <p:stCondLst>
                                     <p:cond delay="0"/>
                                   </p:stCondLst>
                                   <p:childTnLst>
                                     <p:set>
                                       <p:cBhvr>
-                                        <p:cTn id="45" dur="1" fill="hold">
+                                        <p:cTn id="55" dur="1" fill="hold">
                                           <p:stCondLst>
                                             <p:cond delay="0"/>
                                           </p:stCondLst>
@@ -4802,7 +4999,7 @@
                                     </p:set>
                                     <p:animEffect transition="in" filter="fade">
                                       <p:cBhvr>
-                                        <p:cTn id="46" dur="500"/>
+                                        <p:cTn id="56" dur="500"/>
                                         <p:tgtEl>
                                           <p:spTgt spid="38"/>
                                         </p:tgtEl>
@@ -4812,14 +5009,14 @@
                                 </p:cTn>
                               </p:par>
                               <p:par>
-                                <p:cTn id="47" presetID="10" presetClass="entr" presetSubtype="0" fill="hold" nodeType="withEffect">
+                                <p:cTn id="57" presetID="10" presetClass="entr" presetSubtype="0" fill="hold" nodeType="withEffect">
                                   <p:stCondLst>
                                     <p:cond delay="0"/>
                                   </p:stCondLst>
                                   <p:childTnLst>
                                     <p:set>
                                       <p:cBhvr>
-                                        <p:cTn id="48" dur="1" fill="hold">
+                                        <p:cTn id="58" dur="1" fill="hold">
                                           <p:stCondLst>
                                             <p:cond delay="0"/>
                                           </p:stCondLst>
@@ -4837,7 +5034,7 @@
                                     </p:set>
                                     <p:animEffect transition="in" filter="fade">
                                       <p:cBhvr>
-                                        <p:cTn id="49" dur="500"/>
+                                        <p:cTn id="59" dur="500"/>
                                         <p:tgtEl>
                                           <p:spTgt spid="65"/>
                                         </p:tgtEl>
@@ -4847,14 +5044,14 @@
                                 </p:cTn>
                               </p:par>
                               <p:par>
-                                <p:cTn id="50" presetID="10" presetClass="entr" presetSubtype="0" fill="hold" grpId="0" nodeType="withEffect">
+                                <p:cTn id="60" presetID="10" presetClass="entr" presetSubtype="0" fill="hold" grpId="0" nodeType="withEffect">
                                   <p:stCondLst>
                                     <p:cond delay="0"/>
                                   </p:stCondLst>
                                   <p:childTnLst>
                                     <p:set>
                                       <p:cBhvr>
-                                        <p:cTn id="51" dur="1" fill="hold">
+                                        <p:cTn id="61" dur="1" fill="hold">
                                           <p:stCondLst>
                                             <p:cond delay="0"/>
                                           </p:stCondLst>
@@ -4872,7 +5069,7 @@
                                     </p:set>
                                     <p:animEffect transition="in" filter="fade">
                                       <p:cBhvr>
-                                        <p:cTn id="52" dur="500"/>
+                                        <p:cTn id="62" dur="500"/>
                                         <p:tgtEl>
                                           <p:spTgt spid="64"/>
                                         </p:tgtEl>
@@ -4888,26 +5085,26 @@
                     </p:cTn>
                   </p:par>
                   <p:par>
-                    <p:cTn id="53" fill="hold">
+                    <p:cTn id="63" fill="hold">
                       <p:stCondLst>
                         <p:cond delay="indefinite"/>
                       </p:stCondLst>
                       <p:childTnLst>
                         <p:par>
-                          <p:cTn id="54" fill="hold">
+                          <p:cTn id="64" fill="hold">
                             <p:stCondLst>
                               <p:cond delay="0"/>
                             </p:stCondLst>
                             <p:childTnLst>
                               <p:par>
-                                <p:cTn id="55" presetID="10" presetClass="entr" presetSubtype="0" fill="hold" grpId="0" nodeType="clickEffect">
+                                <p:cTn id="65" presetID="10" presetClass="entr" presetSubtype="0" fill="hold" grpId="0" nodeType="clickEffect">
                                   <p:stCondLst>
                                     <p:cond delay="0"/>
                                   </p:stCondLst>
                                   <p:childTnLst>
                                     <p:set>
                                       <p:cBhvr>
-                                        <p:cTn id="56" dur="1" fill="hold">
+                                        <p:cTn id="66" dur="1" fill="hold">
                                           <p:stCondLst>
                                             <p:cond delay="0"/>
                                           </p:stCondLst>
@@ -4925,7 +5122,7 @@
                                     </p:set>
                                     <p:animEffect transition="in" filter="fade">
                                       <p:cBhvr>
-                                        <p:cTn id="57" dur="500"/>
+                                        <p:cTn id="67" dur="500"/>
                                         <p:tgtEl>
                                           <p:spTgt spid="35"/>
                                         </p:tgtEl>
@@ -4935,14 +5132,14 @@
                                 </p:cTn>
                               </p:par>
                               <p:par>
-                                <p:cTn id="58" presetID="10" presetClass="entr" presetSubtype="0" fill="hold" grpId="0" nodeType="withEffect">
+                                <p:cTn id="68" presetID="10" presetClass="entr" presetSubtype="0" fill="hold" grpId="0" nodeType="withEffect">
                                   <p:stCondLst>
                                     <p:cond delay="0"/>
                                   </p:stCondLst>
                                   <p:childTnLst>
                                     <p:set>
                                       <p:cBhvr>
-                                        <p:cTn id="59" dur="1" fill="hold">
+                                        <p:cTn id="69" dur="1" fill="hold">
                                           <p:stCondLst>
                                             <p:cond delay="0"/>
                                           </p:stCondLst>
@@ -4960,7 +5157,7 @@
                                     </p:set>
                                     <p:animEffect transition="in" filter="fade">
                                       <p:cBhvr>
-                                        <p:cTn id="60" dur="500"/>
+                                        <p:cTn id="70" dur="500"/>
                                         <p:tgtEl>
                                           <p:spTgt spid="62"/>
                                         </p:tgtEl>
@@ -4970,14 +5167,14 @@
                                 </p:cTn>
                               </p:par>
                               <p:par>
-                                <p:cTn id="61" presetID="10" presetClass="entr" presetSubtype="0" fill="hold" nodeType="withEffect">
+                                <p:cTn id="71" presetID="10" presetClass="entr" presetSubtype="0" fill="hold" nodeType="withEffect">
                                   <p:stCondLst>
                                     <p:cond delay="0"/>
                                   </p:stCondLst>
                                   <p:childTnLst>
                                     <p:set>
                                       <p:cBhvr>
-                                        <p:cTn id="62" dur="1" fill="hold">
+                                        <p:cTn id="72" dur="1" fill="hold">
                                           <p:stCondLst>
                                             <p:cond delay="0"/>
                                           </p:stCondLst>
@@ -4995,7 +5192,7 @@
                                     </p:set>
                                     <p:animEffect transition="in" filter="fade">
                                       <p:cBhvr>
-                                        <p:cTn id="63" dur="500"/>
+                                        <p:cTn id="73" dur="500"/>
                                         <p:tgtEl>
                                           <p:spTgt spid="51"/>
                                         </p:tgtEl>
@@ -5005,14 +5202,14 @@
                                 </p:cTn>
                               </p:par>
                               <p:par>
-                                <p:cTn id="64" presetID="10" presetClass="entr" presetSubtype="0" fill="hold" grpId="0" nodeType="withEffect">
+                                <p:cTn id="74" presetID="10" presetClass="entr" presetSubtype="0" fill="hold" grpId="0" nodeType="withEffect">
                                   <p:stCondLst>
                                     <p:cond delay="0"/>
                                   </p:stCondLst>
                                   <p:childTnLst>
                                     <p:set>
                                       <p:cBhvr>
-                                        <p:cTn id="65" dur="1" fill="hold">
+                                        <p:cTn id="75" dur="1" fill="hold">
                                           <p:stCondLst>
                                             <p:cond delay="0"/>
                                           </p:stCondLst>
@@ -5030,7 +5227,7 @@
                                     </p:set>
                                     <p:animEffect transition="in" filter="fade">
                                       <p:cBhvr>
-                                        <p:cTn id="66" dur="500"/>
+                                        <p:cTn id="76" dur="500"/>
                                         <p:tgtEl>
                                           <p:spTgt spid="41"/>
                                         </p:tgtEl>
@@ -5040,14 +5237,14 @@
                                 </p:cTn>
                               </p:par>
                               <p:par>
-                                <p:cTn id="67" presetID="10" presetClass="entr" presetSubtype="0" fill="hold" nodeType="withEffect">
+                                <p:cTn id="77" presetID="10" presetClass="entr" presetSubtype="0" fill="hold" nodeType="withEffect">
                                   <p:stCondLst>
                                     <p:cond delay="0"/>
                                   </p:stCondLst>
                                   <p:childTnLst>
                                     <p:set>
                                       <p:cBhvr>
-                                        <p:cTn id="68" dur="1" fill="hold">
+                                        <p:cTn id="78" dur="1" fill="hold">
                                           <p:stCondLst>
                                             <p:cond delay="0"/>
                                           </p:stCondLst>
@@ -5065,7 +5262,7 @@
                                     </p:set>
                                     <p:animEffect transition="in" filter="fade">
                                       <p:cBhvr>
-                                        <p:cTn id="69" dur="500"/>
+                                        <p:cTn id="79" dur="500"/>
                                         <p:tgtEl>
                                           <p:spTgt spid="45"/>
                                         </p:tgtEl>
@@ -5075,14 +5272,14 @@
                                 </p:cTn>
                               </p:par>
                               <p:par>
-                                <p:cTn id="70" presetID="10" presetClass="entr" presetSubtype="0" fill="hold" grpId="0" nodeType="withEffect">
+                                <p:cTn id="80" presetID="10" presetClass="entr" presetSubtype="0" fill="hold" grpId="0" nodeType="withEffect">
                                   <p:stCondLst>
                                     <p:cond delay="0"/>
                                   </p:stCondLst>
                                   <p:childTnLst>
                                     <p:set>
                                       <p:cBhvr>
-                                        <p:cTn id="71" dur="1" fill="hold">
+                                        <p:cTn id="81" dur="1" fill="hold">
                                           <p:stCondLst>
                                             <p:cond delay="0"/>
                                           </p:stCondLst>
@@ -5100,7 +5297,7 @@
                                     </p:set>
                                     <p:animEffect transition="in" filter="fade">
                                       <p:cBhvr>
-                                        <p:cTn id="72" dur="500"/>
+                                        <p:cTn id="82" dur="500"/>
                                         <p:tgtEl>
                                           <p:spTgt spid="50"/>
                                         </p:tgtEl>
@@ -5110,14 +5307,14 @@
                                 </p:cTn>
                               </p:par>
                               <p:par>
-                                <p:cTn id="73" presetID="10" presetClass="entr" presetSubtype="0" fill="hold" nodeType="withEffect">
+                                <p:cTn id="83" presetID="10" presetClass="entr" presetSubtype="0" fill="hold" nodeType="withEffect">
                                   <p:stCondLst>
                                     <p:cond delay="0"/>
                                   </p:stCondLst>
                                   <p:childTnLst>
                                     <p:set>
                                       <p:cBhvr>
-                                        <p:cTn id="74" dur="1" fill="hold">
+                                        <p:cTn id="84" dur="1" fill="hold">
                                           <p:stCondLst>
                                             <p:cond delay="0"/>
                                           </p:stCondLst>
@@ -5135,7 +5332,7 @@
                                     </p:set>
                                     <p:animEffect transition="in" filter="fade">
                                       <p:cBhvr>
-                                        <p:cTn id="75" dur="500"/>
+                                        <p:cTn id="85" dur="500"/>
                                         <p:tgtEl>
                                           <p:spTgt spid="42"/>
                                         </p:tgtEl>
@@ -5151,26 +5348,26 @@
                     </p:cTn>
                   </p:par>
                   <p:par>
-                    <p:cTn id="76" fill="hold">
+                    <p:cTn id="86" fill="hold">
                       <p:stCondLst>
                         <p:cond delay="indefinite"/>
                       </p:stCondLst>
                       <p:childTnLst>
                         <p:par>
-                          <p:cTn id="77" fill="hold">
+                          <p:cTn id="87" fill="hold">
                             <p:stCondLst>
                               <p:cond delay="0"/>
                             </p:stCondLst>
                             <p:childTnLst>
                               <p:par>
-                                <p:cTn id="78" presetID="10" presetClass="entr" presetSubtype="0" fill="hold" grpId="0" nodeType="clickEffect">
+                                <p:cTn id="88" presetID="10" presetClass="entr" presetSubtype="0" fill="hold" grpId="0" nodeType="clickEffect">
                                   <p:stCondLst>
                                     <p:cond delay="0"/>
                                   </p:stCondLst>
                                   <p:childTnLst>
                                     <p:set>
                                       <p:cBhvr>
-                                        <p:cTn id="79" dur="1" fill="hold">
+                                        <p:cTn id="89" dur="1" fill="hold">
                                           <p:stCondLst>
                                             <p:cond delay="0"/>
                                           </p:stCondLst>
@@ -5188,7 +5385,7 @@
                                     </p:set>
                                     <p:animEffect transition="in" filter="fade">
                                       <p:cBhvr>
-                                        <p:cTn id="80" dur="500"/>
+                                        <p:cTn id="90" dur="500"/>
                                         <p:tgtEl>
                                           <p:spTgt spid="55"/>
                                         </p:tgtEl>
@@ -5198,14 +5395,14 @@
                                 </p:cTn>
                               </p:par>
                               <p:par>
-                                <p:cTn id="81" presetID="10" presetClass="entr" presetSubtype="0" fill="hold" nodeType="withEffect">
+                                <p:cTn id="91" presetID="10" presetClass="entr" presetSubtype="0" fill="hold" nodeType="withEffect">
                                   <p:stCondLst>
                                     <p:cond delay="0"/>
                                   </p:stCondLst>
                                   <p:childTnLst>
                                     <p:set>
                                       <p:cBhvr>
-                                        <p:cTn id="82" dur="1" fill="hold">
+                                        <p:cTn id="92" dur="1" fill="hold">
                                           <p:stCondLst>
                                             <p:cond delay="0"/>
                                           </p:stCondLst>
@@ -5223,7 +5420,7 @@
                                     </p:set>
                                     <p:animEffect transition="in" filter="fade">
                                       <p:cBhvr>
-                                        <p:cTn id="83" dur="500"/>
+                                        <p:cTn id="93" dur="500"/>
                                         <p:tgtEl>
                                           <p:spTgt spid="56"/>
                                         </p:tgtEl>
@@ -5233,14 +5430,14 @@
                                 </p:cTn>
                               </p:par>
                               <p:par>
-                                <p:cTn id="84" presetID="10" presetClass="entr" presetSubtype="0" fill="hold" grpId="0" nodeType="withEffect">
+                                <p:cTn id="94" presetID="10" presetClass="entr" presetSubtype="0" fill="hold" grpId="0" nodeType="withEffect">
                                   <p:stCondLst>
                                     <p:cond delay="0"/>
                                   </p:stCondLst>
                                   <p:childTnLst>
                                     <p:set>
                                       <p:cBhvr>
-                                        <p:cTn id="85" dur="1" fill="hold">
+                                        <p:cTn id="95" dur="1" fill="hold">
                                           <p:stCondLst>
                                             <p:cond delay="0"/>
                                           </p:stCondLst>
@@ -5258,7 +5455,7 @@
                                     </p:set>
                                     <p:animEffect transition="in" filter="fade">
                                       <p:cBhvr>
-                                        <p:cTn id="86" dur="500"/>
+                                        <p:cTn id="96" dur="500"/>
                                         <p:tgtEl>
                                           <p:spTgt spid="60"/>
                                         </p:tgtEl>
@@ -5271,20 +5468,20 @@
                           </p:cTn>
                         </p:par>
                         <p:par>
-                          <p:cTn id="87" fill="hold">
+                          <p:cTn id="97" fill="hold">
                             <p:stCondLst>
                               <p:cond delay="500"/>
                             </p:stCondLst>
                             <p:childTnLst>
                               <p:par>
-                                <p:cTn id="88" presetID="10" presetClass="entr" presetSubtype="0" fill="hold" grpId="0" nodeType="afterEffect">
+                                <p:cTn id="98" presetID="10" presetClass="entr" presetSubtype="0" fill="hold" grpId="0" nodeType="afterEffect">
                                   <p:stCondLst>
                                     <p:cond delay="0"/>
                                   </p:stCondLst>
                                   <p:childTnLst>
                                     <p:set>
                                       <p:cBhvr>
-                                        <p:cTn id="89" dur="1" fill="hold">
+                                        <p:cTn id="99" dur="1" fill="hold">
                                           <p:stCondLst>
                                             <p:cond delay="0"/>
                                           </p:stCondLst>
@@ -5302,132 +5499,9 @@
                                     </p:set>
                                     <p:animEffect transition="in" filter="fade">
                                       <p:cBhvr>
-                                        <p:cTn id="90" dur="500"/>
+                                        <p:cTn id="100" dur="500"/>
                                         <p:tgtEl>
                                           <p:spTgt spid="53"/>
-                                        </p:tgtEl>
-                                      </p:cBhvr>
-                                    </p:animEffect>
-                                  </p:childTnLst>
-                                </p:cTn>
-                              </p:par>
-                            </p:childTnLst>
-                          </p:cTn>
-                        </p:par>
-                      </p:childTnLst>
-                    </p:cTn>
-                  </p:par>
-                  <p:par>
-                    <p:cTn id="91" fill="hold">
-                      <p:stCondLst>
-                        <p:cond delay="indefinite"/>
-                      </p:stCondLst>
-                      <p:childTnLst>
-                        <p:par>
-                          <p:cTn id="92" fill="hold">
-                            <p:stCondLst>
-                              <p:cond delay="0"/>
-                            </p:stCondLst>
-                            <p:childTnLst>
-                              <p:par>
-                                <p:cTn id="93" presetID="10" presetClass="entr" presetSubtype="0" fill="hold" nodeType="clickEffect">
-                                  <p:stCondLst>
-                                    <p:cond delay="0"/>
-                                  </p:stCondLst>
-                                  <p:childTnLst>
-                                    <p:set>
-                                      <p:cBhvr>
-                                        <p:cTn id="94" dur="1" fill="hold">
-                                          <p:stCondLst>
-                                            <p:cond delay="0"/>
-                                          </p:stCondLst>
-                                        </p:cTn>
-                                        <p:tgtEl>
-                                          <p:spTgt spid="39"/>
-                                        </p:tgtEl>
-                                        <p:attrNameLst>
-                                          <p:attrName>style.visibility</p:attrName>
-                                        </p:attrNameLst>
-                                      </p:cBhvr>
-                                      <p:to>
-                                        <p:strVal val="visible"/>
-                                      </p:to>
-                                    </p:set>
-                                    <p:animEffect transition="in" filter="fade">
-                                      <p:cBhvr>
-                                        <p:cTn id="95" dur="500"/>
-                                        <p:tgtEl>
-                                          <p:spTgt spid="39"/>
-                                        </p:tgtEl>
-                                      </p:cBhvr>
-                                    </p:animEffect>
-                                  </p:childTnLst>
-                                </p:cTn>
-                              </p:par>
-                              <p:par>
-                                <p:cTn id="96" presetID="10" presetClass="entr" presetSubtype="0" fill="hold" nodeType="withEffect">
-                                  <p:stCondLst>
-                                    <p:cond delay="0"/>
-                                  </p:stCondLst>
-                                  <p:childTnLst>
-                                    <p:set>
-                                      <p:cBhvr>
-                                        <p:cTn id="97" dur="1" fill="hold">
-                                          <p:stCondLst>
-                                            <p:cond delay="0"/>
-                                          </p:stCondLst>
-                                        </p:cTn>
-                                        <p:tgtEl>
-                                          <p:spTgt spid="37"/>
-                                        </p:tgtEl>
-                                        <p:attrNameLst>
-                                          <p:attrName>style.visibility</p:attrName>
-                                        </p:attrNameLst>
-                                      </p:cBhvr>
-                                      <p:to>
-                                        <p:strVal val="visible"/>
-                                      </p:to>
-                                    </p:set>
-                                    <p:animEffect transition="in" filter="fade">
-                                      <p:cBhvr>
-                                        <p:cTn id="98" dur="500"/>
-                                        <p:tgtEl>
-                                          <p:spTgt spid="37"/>
-                                        </p:tgtEl>
-                                      </p:cBhvr>
-                                    </p:animEffect>
-                                  </p:childTnLst>
-                                </p:cTn>
-                              </p:par>
-                              <p:par>
-                                <p:cTn id="99" presetID="10" presetClass="entr" presetSubtype="0" fill="hold" grpId="0" nodeType="withEffect">
-                                  <p:stCondLst>
-                                    <p:cond delay="0"/>
-                                  </p:stCondLst>
-                                  <p:childTnLst>
-                                    <p:set>
-                                      <p:cBhvr>
-                                        <p:cTn id="100" dur="1" fill="hold">
-                                          <p:stCondLst>
-                                            <p:cond delay="0"/>
-                                          </p:stCondLst>
-                                        </p:cTn>
-                                        <p:tgtEl>
-                                          <p:spTgt spid="36"/>
-                                        </p:tgtEl>
-                                        <p:attrNameLst>
-                                          <p:attrName>style.visibility</p:attrName>
-                                        </p:attrNameLst>
-                                      </p:cBhvr>
-                                      <p:to>
-                                        <p:strVal val="visible"/>
-                                      </p:to>
-                                    </p:set>
-                                    <p:animEffect transition="in" filter="fade">
-                                      <p:cBhvr>
-                                        <p:cTn id="101" dur="500"/>
-                                        <p:tgtEl>
-                                          <p:spTgt spid="36"/>
                                         </p:tgtEl>
                                       </p:cBhvr>
                                     </p:animEffect>
@@ -5476,10 +5550,12 @@
       <p:bldP spid="55" grpId="0" animBg="1"/>
       <p:bldP spid="60" grpId="0"/>
       <p:bldP spid="67" grpId="0" animBg="1"/>
+      <p:bldP spid="69" grpId="0" animBg="1"/>
+      <p:bldP spid="71" grpId="0"/>
       <p:bldP spid="73" grpId="0" animBg="1"/>
       <p:bldP spid="74" grpId="0"/>
+      <p:bldP spid="80" grpId="0"/>
       <p:bldP spid="35" grpId="0"/>
-      <p:bldP spid="36" grpId="0" animBg="1"/>
     </p:bldLst>
   </p:timing>
 </p:sld>

</xml_diff>